<commit_message>
Added a slide in exceptions slides for exercise
</commit_message>
<xml_diff>
--- a/ClassMaterials/OOAndExceptions/Slides/Part3-ExceptionHandling.pptx
+++ b/ClassMaterials/OOAndExceptions/Slides/Part3-ExceptionHandling.pptx
@@ -6,7 +6,7 @@
     <p:sldMasterId id="2147483661" r:id="rId5"/>
   </p:sldMasterIdLst>
   <p:notesMasterIdLst>
-    <p:notesMasterId r:id="rId17"/>
+    <p:notesMasterId r:id="rId18"/>
   </p:notesMasterIdLst>
   <p:sldIdLst>
     <p:sldId id="256" r:id="rId6"/>
@@ -19,7 +19,8 @@
     <p:sldId id="269" r:id="rId13"/>
     <p:sldId id="270" r:id="rId14"/>
     <p:sldId id="271" r:id="rId15"/>
-    <p:sldId id="272" r:id="rId16"/>
+    <p:sldId id="284" r:id="rId16"/>
+    <p:sldId id="272" r:id="rId17"/>
   </p:sldIdLst>
   <p:sldSz cx="9144000" cy="6858000" type="screen4x3"/>
   <p:notesSz cx="7315200" cy="9601200"/>
@@ -1650,6 +1651,208 @@
         </p:txBody>
       </p:sp>
     </p:spTree>
+  </p:cSld>
+  <p:clrMapOvr>
+    <a:masterClrMapping/>
+  </p:clrMapOvr>
+</p:notes>
+</file>
+
+<file path=ppt/notesSlides/notesSlide9.xml><?xml version="1.0" encoding="utf-8"?>
+<p:notes xmlns:a="http://schemas.openxmlformats.org/drawingml/2006/main" xmlns:r="http://schemas.openxmlformats.org/officeDocument/2006/relationships" xmlns:p="http://schemas.openxmlformats.org/presentationml/2006/main">
+  <p:cSld>
+    <p:spTree>
+      <p:nvGrpSpPr>
+        <p:cNvPr id="1" name=""/>
+        <p:cNvGrpSpPr/>
+        <p:nvPr/>
+      </p:nvGrpSpPr>
+      <p:grpSpPr>
+        <a:xfrm>
+          <a:off x="0" y="0"/>
+          <a:ext cx="0" cy="0"/>
+          <a:chOff x="0" y="0"/>
+          <a:chExt cx="0" cy="0"/>
+        </a:xfrm>
+      </p:grpSpPr>
+      <p:sp>
+        <p:nvSpPr>
+          <p:cNvPr id="221" name="PlaceHolder 1"/>
+          <p:cNvSpPr>
+            <a:spLocks noGrp="1"/>
+          </p:cNvSpPr>
+          <p:nvPr>
+            <p:ph type="body"/>
+          </p:nvPr>
+        </p:nvSpPr>
+        <p:spPr>
+          <a:xfrm>
+            <a:off x="731880" y="4560840"/>
+            <a:ext cx="5850360" cy="4320000"/>
+          </a:xfrm>
+          <a:prstGeom prst="rect">
+            <a:avLst/>
+          </a:prstGeom>
+        </p:spPr>
+        <p:txBody>
+          <a:bodyPr lIns="96480" tIns="48240" rIns="96480" bIns="48240"/>
+          <a:lstStyle/>
+          <a:p>
+            <a:r>
+              <a:rPr lang="en-US" sz="2000" b="0" strike="noStrike" spc="-1">
+                <a:solidFill>
+                  <a:srgbClr val="000000"/>
+                </a:solidFill>
+                <a:uFill>
+                  <a:solidFill>
+                    <a:srgbClr val="FFFFFF"/>
+                  </a:solidFill>
+                </a:uFill>
+                <a:latin typeface="Arial"/>
+              </a:rPr>
+              <a:t>Add exception handling code to GameOfLifeMain around call to loadGameState().  </a:t>
+            </a:r>
+          </a:p>
+          <a:p>
+            <a:r>
+              <a:rPr lang="en-US" sz="2000" b="0" strike="noStrike" spc="-1">
+                <a:solidFill>
+                  <a:srgbClr val="000000"/>
+                </a:solidFill>
+                <a:uFill>
+                  <a:solidFill>
+                    <a:srgbClr val="FFFFFF"/>
+                  </a:solidFill>
+                </a:uFill>
+                <a:latin typeface="Arial"/>
+              </a:rPr>
+              <a:t>Demonstrate crasher first, e.g </a:t>
+            </a:r>
+          </a:p>
+          <a:p>
+            <a:r>
+              <a:rPr lang="en-US" sz="2000" b="0" strike="noStrike" spc="-1">
+                <a:solidFill>
+                  <a:srgbClr val="000000"/>
+                </a:solidFill>
+                <a:uFill>
+                  <a:solidFill>
+                    <a:srgbClr val="FFFFFF"/>
+                  </a:solidFill>
+                </a:uFill>
+                <a:latin typeface="Arial"/>
+              </a:rPr>
+              <a:t>- use the name of a file that does not exist</a:t>
+            </a:r>
+          </a:p>
+          <a:p>
+            <a:r>
+              <a:rPr lang="en-US" sz="2000" b="0" strike="noStrike" spc="-1">
+                <a:solidFill>
+                  <a:srgbClr val="000000"/>
+                </a:solidFill>
+                <a:uFill>
+                  <a:solidFill>
+                    <a:srgbClr val="FFFFFF"/>
+                  </a:solidFill>
+                </a:uFill>
+                <a:latin typeface="Arial"/>
+              </a:rPr>
+              <a:t>- demo a bad input file (See FilesAndExceptiosn/badInput.txt)</a:t>
+            </a:r>
+          </a:p>
+          <a:p>
+            <a:r>
+              <a:rPr lang="en-US" sz="2000" b="0" strike="noStrike" spc="-1">
+                <a:solidFill>
+                  <a:srgbClr val="000000"/>
+                </a:solidFill>
+                <a:uFill>
+                  <a:solidFill>
+                    <a:srgbClr val="FFFFFF"/>
+                  </a:solidFill>
+                </a:uFill>
+                <a:latin typeface="Arial"/>
+              </a:rPr>
+              <a:t>Note: There is a file FilesAndExceptions/AcornInput.txt</a:t>
+            </a:r>
+          </a:p>
+        </p:txBody>
+      </p:sp>
+      <p:sp>
+        <p:nvSpPr>
+          <p:cNvPr id="222" name="CustomShape 2"/>
+          <p:cNvSpPr/>
+          <p:nvPr/>
+        </p:nvSpPr>
+        <p:spPr>
+          <a:xfrm>
+            <a:off x="4143240" y="9118440"/>
+            <a:ext cx="3169080" cy="479880"/>
+          </a:xfrm>
+          <a:prstGeom prst="rect">
+            <a:avLst/>
+          </a:prstGeom>
+          <a:noFill/>
+          <a:ln w="9360">
+            <a:noFill/>
+          </a:ln>
+        </p:spPr>
+        <p:style>
+          <a:lnRef idx="0">
+            <a:scrgbClr r="0" g="0" b="0"/>
+          </a:lnRef>
+          <a:fillRef idx="0">
+            <a:scrgbClr r="0" g="0" b="0"/>
+          </a:fillRef>
+          <a:effectRef idx="0">
+            <a:scrgbClr r="0" g="0" b="0"/>
+          </a:effectRef>
+          <a:fontRef idx="minor"/>
+        </p:style>
+        <p:txBody>
+          <a:bodyPr lIns="96480" tIns="48240" rIns="96480" bIns="48240" anchor="b"/>
+          <a:lstStyle/>
+          <a:p>
+            <a:pPr algn="r">
+              <a:lnSpc>
+                <a:spcPct val="100000"/>
+              </a:lnSpc>
+            </a:pPr>
+            <a:fld id="{40B497DE-A164-4D94-A609-3C0CF437DB10}" type="slidenum">
+              <a:rPr lang="en-US" sz="1200" b="0" strike="noStrike" spc="-1">
+                <a:solidFill>
+                  <a:srgbClr val="000000"/>
+                </a:solidFill>
+                <a:uFill>
+                  <a:solidFill>
+                    <a:srgbClr val="FFFFFF"/>
+                  </a:solidFill>
+                </a:uFill>
+                <a:latin typeface="Calibri"/>
+              </a:rPr>
+              <a:t>11</a:t>
+            </a:fld>
+            <a:endParaRPr lang="en-US" sz="1800" b="0" strike="noStrike" spc="-1">
+              <a:solidFill>
+                <a:srgbClr val="000000"/>
+              </a:solidFill>
+              <a:uFill>
+                <a:solidFill>
+                  <a:srgbClr val="FFFFFF"/>
+                </a:solidFill>
+              </a:uFill>
+              <a:latin typeface="Arial"/>
+            </a:endParaRPr>
+          </a:p>
+        </p:txBody>
+      </p:sp>
+    </p:spTree>
+    <p:extLst>
+      <p:ext uri="{BB962C8B-B14F-4D97-AF65-F5344CB8AC3E}">
+        <p14:creationId xmlns:p14="http://schemas.microsoft.com/office/powerpoint/2010/main" val="4110991076"/>
+      </p:ext>
+    </p:extLst>
   </p:cSld>
   <p:clrMapOvr>
     <a:masterClrMapping/>
@@ -7080,6 +7283,66 @@
 </file>
 
 <file path=ppt/slides/slide11.xml><?xml version="1.0" encoding="utf-8"?>
+<p:sld xmlns:a="http://schemas.openxmlformats.org/drawingml/2006/main" xmlns:r="http://schemas.openxmlformats.org/officeDocument/2006/relationships" xmlns:p="http://schemas.openxmlformats.org/presentationml/2006/main">
+  <p:cSld>
+    <p:spTree>
+      <p:nvGrpSpPr>
+        <p:cNvPr id="1" name=""/>
+        <p:cNvGrpSpPr/>
+        <p:nvPr/>
+      </p:nvGrpSpPr>
+      <p:grpSpPr>
+        <a:xfrm>
+          <a:off x="0" y="0"/>
+          <a:ext cx="0" cy="0"/>
+          <a:chOff x="0" y="0"/>
+          <a:chExt cx="0" cy="0"/>
+        </a:xfrm>
+      </p:grpSpPr>
+      <p:pic>
+        <p:nvPicPr>
+          <p:cNvPr id="2" name="Picture 1">
+            <a:extLst>
+              <a:ext uri="{FF2B5EF4-FFF2-40B4-BE49-F238E27FC236}">
+                <a16:creationId xmlns:a16="http://schemas.microsoft.com/office/drawing/2014/main" id="{3F2F8C35-ADDE-DE8C-6BD6-B61A491FA6F3}"/>
+              </a:ext>
+            </a:extLst>
+          </p:cNvPr>
+          <p:cNvPicPr>
+            <a:picLocks noChangeAspect="1"/>
+          </p:cNvPicPr>
+          <p:nvPr/>
+        </p:nvPicPr>
+        <p:blipFill>
+          <a:blip r:embed="rId3"/>
+          <a:stretch>
+            <a:fillRect/>
+          </a:stretch>
+        </p:blipFill>
+        <p:spPr>
+          <a:xfrm>
+            <a:off x="2392873" y="0"/>
+            <a:ext cx="4358254" cy="6858000"/>
+          </a:xfrm>
+          <a:prstGeom prst="rect">
+            <a:avLst/>
+          </a:prstGeom>
+        </p:spPr>
+      </p:pic>
+    </p:spTree>
+    <p:extLst>
+      <p:ext uri="{BB962C8B-B14F-4D97-AF65-F5344CB8AC3E}">
+        <p14:creationId xmlns:p14="http://schemas.microsoft.com/office/powerpoint/2010/main" val="3336966289"/>
+      </p:ext>
+    </p:extLst>
+  </p:cSld>
+  <p:clrMapOvr>
+    <a:masterClrMapping/>
+  </p:clrMapOvr>
+</p:sld>
+</file>
+
+<file path=ppt/slides/slide12.xml><?xml version="1.0" encoding="utf-8"?>
 <p:sld xmlns:a="http://schemas.openxmlformats.org/drawingml/2006/main" xmlns:r="http://schemas.openxmlformats.org/officeDocument/2006/relationships" xmlns:p="http://schemas.openxmlformats.org/presentationml/2006/main">
   <p:cSld>
     <p:spTree>
@@ -15394,6 +15657,26 @@
 </file>
 
 <file path=customXml/item1.xml><?xml version="1.0" encoding="utf-8"?>
+<p:properties xmlns:p="http://schemas.microsoft.com/office/2006/metadata/properties" xmlns:xsi="http://www.w3.org/2001/XMLSchema-instance" xmlns:pc="http://schemas.microsoft.com/office/infopath/2007/PartnerControls">
+  <documentManagement>
+    <TaxCatchAll xmlns="820f9cb1-409d-4c4b-8197-1d4f7dd48124" xsi:nil="true"/>
+    <lcf76f155ced4ddcb4097134ff3c332f xmlns="08600313-7276-4ca7-b5d3-7d86193ee0ac">
+      <Terms xmlns="http://schemas.microsoft.com/office/infopath/2007/PartnerControls"/>
+    </lcf76f155ced4ddcb4097134ff3c332f>
+  </documentManagement>
+</p:properties>
+</file>
+
+<file path=customXml/item2.xml><?xml version="1.0" encoding="utf-8"?>
+<?mso-contentType ?>
+<FormTemplates xmlns="http://schemas.microsoft.com/sharepoint/v3/contenttype/forms">
+  <Display>DocumentLibraryForm</Display>
+  <Edit>DocumentLibraryForm</Edit>
+  <New>DocumentLibraryForm</New>
+</FormTemplates>
+</file>
+
+<file path=customXml/item3.xml><?xml version="1.0" encoding="utf-8"?>
 <ct:contentTypeSchema xmlns:ct="http://schemas.microsoft.com/office/2006/metadata/contentType" xmlns:ma="http://schemas.microsoft.com/office/2006/metadata/properties/metaAttributes" ct:_="" ma:_="" ma:contentTypeName="Document" ma:contentTypeID="0x0101004285D81DBE5F5A448E892B34D6B8CF20" ma:contentTypeVersion="8" ma:contentTypeDescription="Create a new document." ma:contentTypeScope="" ma:versionID="ecce54155d2ea7caa9aed06c8b6b9867">
   <xsd:schema xmlns:xsd="http://www.w3.org/2001/XMLSchema" xmlns:xs="http://www.w3.org/2001/XMLSchema" xmlns:p="http://schemas.microsoft.com/office/2006/metadata/properties" xmlns:ns2="08600313-7276-4ca7-b5d3-7d86193ee0ac" xmlns:ns3="820f9cb1-409d-4c4b-8197-1d4f7dd48124" targetNamespace="http://schemas.microsoft.com/office/2006/metadata/properties" ma:root="true" ma:fieldsID="bfd7385540b70b2fe84ac888cc214377" ns2:_="" ns3:_="">
     <xsd:import namespace="08600313-7276-4ca7-b5d3-7d86193ee0ac"/>
@@ -15570,28 +15853,15 @@
 </ct:contentTypeSchema>
 </file>
 
-<file path=customXml/item2.xml><?xml version="1.0" encoding="utf-8"?>
-<?mso-contentType ?>
-<FormTemplates xmlns="http://schemas.microsoft.com/sharepoint/v3/contenttype/forms">
-  <Display>DocumentLibraryForm</Display>
-  <Edit>DocumentLibraryForm</Edit>
-  <New>DocumentLibraryForm</New>
-</FormTemplates>
-</file>
-
-<file path=customXml/item3.xml><?xml version="1.0" encoding="utf-8"?>
-<p:properties xmlns:p="http://schemas.microsoft.com/office/2006/metadata/properties" xmlns:xsi="http://www.w3.org/2001/XMLSchema-instance" xmlns:pc="http://schemas.microsoft.com/office/infopath/2007/PartnerControls">
-  <documentManagement>
-    <TaxCatchAll xmlns="820f9cb1-409d-4c4b-8197-1d4f7dd48124" xsi:nil="true"/>
-    <lcf76f155ced4ddcb4097134ff3c332f xmlns="08600313-7276-4ca7-b5d3-7d86193ee0ac">
-      <Terms xmlns="http://schemas.microsoft.com/office/infopath/2007/PartnerControls"/>
-    </lcf76f155ced4ddcb4097134ff3c332f>
-  </documentManagement>
-</p:properties>
-</file>
-
 <file path=customXml/itemProps1.xml><?xml version="1.0" encoding="utf-8"?>
-<ds:datastoreItem xmlns:ds="http://schemas.openxmlformats.org/officeDocument/2006/customXml" ds:itemID="{74EDD9DE-4993-48BD-A320-B7ED6C251005}"/>
+<ds:datastoreItem xmlns:ds="http://schemas.openxmlformats.org/officeDocument/2006/customXml" ds:itemID="{FBC30A03-96C5-4843-A046-F16D54BDCFE9}">
+  <ds:schemaRefs>
+    <ds:schemaRef ds:uri="http://schemas.microsoft.com/office/2006/metadata/properties"/>
+    <ds:schemaRef ds:uri="http://schemas.microsoft.com/office/infopath/2007/PartnerControls"/>
+    <ds:schemaRef ds:uri="820f9cb1-409d-4c4b-8197-1d4f7dd48124"/>
+    <ds:schemaRef ds:uri="08600313-7276-4ca7-b5d3-7d86193ee0ac"/>
+  </ds:schemaRefs>
+</ds:datastoreItem>
 </file>
 
 <file path=customXml/itemProps2.xml><?xml version="1.0" encoding="utf-8"?>
@@ -15603,10 +15873,20 @@
 </file>
 
 <file path=customXml/itemProps3.xml><?xml version="1.0" encoding="utf-8"?>
-<ds:datastoreItem xmlns:ds="http://schemas.openxmlformats.org/officeDocument/2006/customXml" ds:itemID="{FBC30A03-96C5-4843-A046-F16D54BDCFE9}">
+<ds:datastoreItem xmlns:ds="http://schemas.openxmlformats.org/officeDocument/2006/customXml" ds:itemID="{74EDD9DE-4993-48BD-A320-B7ED6C251005}">
   <ds:schemaRefs>
+    <ds:schemaRef ds:uri="http://schemas.microsoft.com/office/2006/metadata/contentType"/>
+    <ds:schemaRef ds:uri="http://schemas.microsoft.com/office/2006/metadata/properties/metaAttributes"/>
+    <ds:schemaRef ds:uri="http://www.w3.org/2001/XMLSchema"/>
     <ds:schemaRef ds:uri="http://schemas.microsoft.com/office/2006/metadata/properties"/>
+    <ds:schemaRef ds:uri="08600313-7276-4ca7-b5d3-7d86193ee0ac"/>
+    <ds:schemaRef ds:uri="820f9cb1-409d-4c4b-8197-1d4f7dd48124"/>
+    <ds:schemaRef ds:uri="http://schemas.microsoft.com/office/2006/documentManagement/types"/>
     <ds:schemaRef ds:uri="http://schemas.microsoft.com/office/infopath/2007/PartnerControls"/>
+    <ds:schemaRef ds:uri="http://schemas.openxmlformats.org/package/2006/metadata/core-properties"/>
+    <ds:schemaRef ds:uri="http://purl.org/dc/elements/1.1/"/>
+    <ds:schemaRef ds:uri="http://purl.org/dc/terms/"/>
+    <ds:schemaRef ds:uri="http://schemas.microsoft.com/internal/obd"/>
   </ds:schemaRefs>
 </ds:datastoreItem>
 </file>
</xml_diff>

<commit_message>
tweaked slides for part 3
</commit_message>
<xml_diff>
--- a/ClassMaterials/OOAndExceptions/Slides/Part3-ExceptionHandling.pptx
+++ b/ClassMaterials/OOAndExceptions/Slides/Part3-ExceptionHandling.pptx
@@ -6,7 +6,7 @@
     <p:sldMasterId id="2147483661" r:id="rId5"/>
   </p:sldMasterIdLst>
   <p:notesMasterIdLst>
-    <p:notesMasterId r:id="rId18"/>
+    <p:notesMasterId r:id="rId19"/>
   </p:notesMasterIdLst>
   <p:sldIdLst>
     <p:sldId id="256" r:id="rId6"/>
@@ -21,6 +21,7 @@
     <p:sldId id="271" r:id="rId15"/>
     <p:sldId id="284" r:id="rId16"/>
     <p:sldId id="272" r:id="rId17"/>
+    <p:sldId id="285" r:id="rId18"/>
   </p:sldIdLst>
   <p:sldSz cx="9144000" cy="6858000" type="screen4x3"/>
   <p:notesSz cx="7315200" cy="9601200"/>
@@ -130,7 +131,7 @@
 <file path=ppt/revisionInfo.xml><?xml version="1.0" encoding="utf-8"?>
 <p1510:revInfo xmlns:a="http://schemas.openxmlformats.org/drawingml/2006/main" xmlns:r="http://schemas.openxmlformats.org/officeDocument/2006/relationships" xmlns:p1510="http://schemas.microsoft.com/office/powerpoint/2015/10/main">
   <p1510:revLst>
-    <p1510:client id="{6C7D68E5-FF66-49C3-8B9C-3F32F6E035AA}" v="1" dt="2021-10-29T01:54:58.058"/>
+    <p1510:client id="{AB5B193D-6709-4734-BCE0-822F77AAE2AD}" v="1" dt="2023-10-24T12:59:11.931"/>
   </p1510:revLst>
 </p1510:revInfo>
 </file>
@@ -158,6 +159,83 @@
             <ac:spMk id="113" creationId="{00000000-0000-0000-0000-000000000000}"/>
           </ac:spMkLst>
         </pc:spChg>
+      </pc:sldChg>
+    </pc:docChg>
+  </pc:docChgLst>
+  <pc:docChgLst>
+    <pc:chgData name="Yoder, Jason" userId="28f4d4d8-da04-4f86-b14d-a21675737bc5" providerId="ADAL" clId="{AB5B193D-6709-4734-BCE0-822F77AAE2AD}"/>
+    <pc:docChg chg="custSel addSld modSld">
+      <pc:chgData name="Yoder, Jason" userId="28f4d4d8-da04-4f86-b14d-a21675737bc5" providerId="ADAL" clId="{AB5B193D-6709-4734-BCE0-822F77AAE2AD}" dt="2023-10-24T13:19:51.285" v="1321" actId="6549"/>
+      <pc:docMkLst>
+        <pc:docMk/>
+      </pc:docMkLst>
+      <pc:sldChg chg="modNotesTx">
+        <pc:chgData name="Yoder, Jason" userId="28f4d4d8-da04-4f86-b14d-a21675737bc5" providerId="ADAL" clId="{AB5B193D-6709-4734-BCE0-822F77AAE2AD}" dt="2023-10-24T12:36:38.336" v="417" actId="20577"/>
+        <pc:sldMkLst>
+          <pc:docMk/>
+          <pc:sldMk cId="0" sldId="271"/>
+        </pc:sldMkLst>
+      </pc:sldChg>
+      <pc:sldChg chg="addSp delSp modSp mod modNotesTx">
+        <pc:chgData name="Yoder, Jason" userId="28f4d4d8-da04-4f86-b14d-a21675737bc5" providerId="ADAL" clId="{AB5B193D-6709-4734-BCE0-822F77AAE2AD}" dt="2023-10-24T13:19:51.285" v="1321" actId="6549"/>
+        <pc:sldMkLst>
+          <pc:docMk/>
+          <pc:sldMk cId="0" sldId="272"/>
+        </pc:sldMkLst>
+        <pc:spChg chg="mod">
+          <ac:chgData name="Yoder, Jason" userId="28f4d4d8-da04-4f86-b14d-a21675737bc5" providerId="ADAL" clId="{AB5B193D-6709-4734-BCE0-822F77AAE2AD}" dt="2023-10-24T13:19:51.285" v="1321" actId="6549"/>
+          <ac:spMkLst>
+            <pc:docMk/>
+            <pc:sldMk cId="0" sldId="272"/>
+            <ac:spMk id="197" creationId="{00000000-0000-0000-0000-000000000000}"/>
+          </ac:spMkLst>
+        </pc:spChg>
+        <pc:picChg chg="add del mod">
+          <ac:chgData name="Yoder, Jason" userId="28f4d4d8-da04-4f86-b14d-a21675737bc5" providerId="ADAL" clId="{AB5B193D-6709-4734-BCE0-822F77AAE2AD}" dt="2023-10-24T12:59:11.260" v="456" actId="21"/>
+          <ac:picMkLst>
+            <pc:docMk/>
+            <pc:sldMk cId="0" sldId="272"/>
+            <ac:picMk id="3" creationId="{4B3D79A6-28D8-0EFB-D189-16F762B62C27}"/>
+          </ac:picMkLst>
+        </pc:picChg>
+      </pc:sldChg>
+      <pc:sldChg chg="modNotesTx">
+        <pc:chgData name="Yoder, Jason" userId="28f4d4d8-da04-4f86-b14d-a21675737bc5" providerId="ADAL" clId="{AB5B193D-6709-4734-BCE0-822F77AAE2AD}" dt="2023-10-24T13:07:32.981" v="1110" actId="20577"/>
+        <pc:sldMkLst>
+          <pc:docMk/>
+          <pc:sldMk cId="3336966289" sldId="284"/>
+        </pc:sldMkLst>
+      </pc:sldChg>
+      <pc:sldChg chg="addSp modSp new mod">
+        <pc:chgData name="Yoder, Jason" userId="28f4d4d8-da04-4f86-b14d-a21675737bc5" providerId="ADAL" clId="{AB5B193D-6709-4734-BCE0-822F77AAE2AD}" dt="2023-10-24T13:00:54.058" v="683" actId="1076"/>
+        <pc:sldMkLst>
+          <pc:docMk/>
+          <pc:sldMk cId="2054310034" sldId="285"/>
+        </pc:sldMkLst>
+        <pc:spChg chg="mod">
+          <ac:chgData name="Yoder, Jason" userId="28f4d4d8-da04-4f86-b14d-a21675737bc5" providerId="ADAL" clId="{AB5B193D-6709-4734-BCE0-822F77AAE2AD}" dt="2023-10-24T12:59:19.046" v="459"/>
+          <ac:spMkLst>
+            <pc:docMk/>
+            <pc:sldMk cId="2054310034" sldId="285"/>
+            <ac:spMk id="2" creationId="{AD932DFD-9C15-7FAC-BF2C-D2E3FE7A812F}"/>
+          </ac:spMkLst>
+        </pc:spChg>
+        <pc:spChg chg="mod">
+          <ac:chgData name="Yoder, Jason" userId="28f4d4d8-da04-4f86-b14d-a21675737bc5" providerId="ADAL" clId="{AB5B193D-6709-4734-BCE0-822F77AAE2AD}" dt="2023-10-24T13:00:54.058" v="683" actId="1076"/>
+          <ac:spMkLst>
+            <pc:docMk/>
+            <pc:sldMk cId="2054310034" sldId="285"/>
+            <ac:spMk id="3" creationId="{69A103E3-E27A-D95A-A260-87280C85FB38}"/>
+          </ac:spMkLst>
+        </pc:spChg>
+        <pc:picChg chg="add mod modCrop">
+          <ac:chgData name="Yoder, Jason" userId="28f4d4d8-da04-4f86-b14d-a21675737bc5" providerId="ADAL" clId="{AB5B193D-6709-4734-BCE0-822F77AAE2AD}" dt="2023-10-24T13:00:15.549" v="608" actId="1076"/>
+          <ac:picMkLst>
+            <pc:docMk/>
+            <pc:sldMk cId="2054310034" sldId="285"/>
+            <ac:picMk id="4" creationId="{A9EECB26-34C6-57B9-88EE-E87D1C4806AC}"/>
+          </ac:picMkLst>
+        </pc:picChg>
       </pc:sldChg>
     </pc:docChg>
   </pc:docChgLst>
@@ -632,6 +710,301 @@
 </p:notes>
 </file>
 
+<file path=ppt/notesSlides/notesSlide10.xml><?xml version="1.0" encoding="utf-8"?>
+<p:notes xmlns:a="http://schemas.openxmlformats.org/drawingml/2006/main" xmlns:r="http://schemas.openxmlformats.org/officeDocument/2006/relationships" xmlns:p="http://schemas.openxmlformats.org/presentationml/2006/main">
+  <p:cSld>
+    <p:spTree>
+      <p:nvGrpSpPr>
+        <p:cNvPr id="1" name=""/>
+        <p:cNvGrpSpPr/>
+        <p:nvPr/>
+      </p:nvGrpSpPr>
+      <p:grpSpPr>
+        <a:xfrm>
+          <a:off x="0" y="0"/>
+          <a:ext cx="0" cy="0"/>
+          <a:chOff x="0" y="0"/>
+          <a:chExt cx="0" cy="0"/>
+        </a:xfrm>
+      </p:grpSpPr>
+      <p:sp>
+        <p:nvSpPr>
+          <p:cNvPr id="2" name="Slide Image Placeholder 1"/>
+          <p:cNvSpPr>
+            <a:spLocks noGrp="1" noRot="1" noChangeAspect="1"/>
+          </p:cNvSpPr>
+          <p:nvPr>
+            <p:ph type="sldImg"/>
+          </p:nvPr>
+        </p:nvSpPr>
+        <p:spPr>
+          <a:xfrm>
+            <a:off x="1497013" y="1200150"/>
+            <a:ext cx="4321175" cy="3240088"/>
+          </a:xfrm>
+          <a:prstGeom prst="rect">
+            <a:avLst/>
+          </a:prstGeom>
+          <a:noFill/>
+          <a:ln w="12700">
+            <a:solidFill>
+              <a:prstClr val="black"/>
+            </a:solidFill>
+          </a:ln>
+        </p:spPr>
+      </p:sp>
+      <p:sp>
+        <p:nvSpPr>
+          <p:cNvPr id="3" name="Notes Placeholder 2"/>
+          <p:cNvSpPr>
+            <a:spLocks noGrp="1"/>
+          </p:cNvSpPr>
+          <p:nvPr>
+            <p:ph type="body" idx="1"/>
+          </p:nvPr>
+        </p:nvSpPr>
+        <p:spPr/>
+        <p:txBody>
+          <a:bodyPr/>
+          <a:lstStyle/>
+          <a:p>
+            <a:r>
+              <a:rPr lang="en-US" dirty="0"/>
+              <a:t>0:45-0:53</a:t>
+            </a:r>
+          </a:p>
+          <a:p>
+            <a:r>
+              <a:rPr lang="en-US" dirty="0"/>
+              <a:t>Get them started on this BEFORE starting break</a:t>
+            </a:r>
+          </a:p>
+          <a:p>
+            <a:r>
+              <a:rPr lang="en-US" dirty="0"/>
+              <a:t>Walk through how the code operates in </a:t>
+            </a:r>
+            <a:r>
+              <a:rPr lang="en-US" dirty="0" err="1"/>
+              <a:t>FileAverage</a:t>
+            </a:r>
+            <a:r>
+              <a:rPr lang="en-US" dirty="0"/>
+              <a:t> with them</a:t>
+            </a:r>
+          </a:p>
+          <a:p>
+            <a:r>
+              <a:rPr lang="en-US" dirty="0"/>
+              <a:t>Explain what happens in </a:t>
+            </a:r>
+            <a:r>
+              <a:rPr lang="en-US" dirty="0" err="1"/>
+              <a:t>FileBestScore</a:t>
+            </a:r>
+            <a:r>
+              <a:rPr lang="en-US" dirty="0"/>
+              <a:t> and ask them to work on it during the second hour.</a:t>
+            </a:r>
+          </a:p>
+          <a:p>
+            <a:r>
+              <a:rPr lang="en-US" dirty="0"/>
+              <a:t>1:20 – give 20 minutes of </a:t>
+            </a:r>
+            <a:r>
+              <a:rPr lang="en-US" dirty="0" err="1"/>
+              <a:t>classtime</a:t>
+            </a:r>
+            <a:r>
+              <a:rPr lang="en-US" dirty="0"/>
+              <a:t> to try to resolve these before working through solution with them.</a:t>
+            </a:r>
+          </a:p>
+          <a:p>
+            <a:endParaRPr lang="en-US" dirty="0"/>
+          </a:p>
+          <a:p>
+            <a:endParaRPr lang="en-US" dirty="0"/>
+          </a:p>
+        </p:txBody>
+      </p:sp>
+      <p:sp>
+        <p:nvSpPr>
+          <p:cNvPr id="4" name="Slide Number Placeholder 3"/>
+          <p:cNvSpPr>
+            <a:spLocks noGrp="1"/>
+          </p:cNvSpPr>
+          <p:nvPr>
+            <p:ph type="sldNum"/>
+          </p:nvPr>
+        </p:nvSpPr>
+        <p:spPr/>
+        <p:txBody>
+          <a:bodyPr/>
+          <a:lstStyle/>
+          <a:p>
+            <a:pPr algn="r"/>
+            <a:fld id="{B630EBB8-CEB5-4E8D-9A06-06438377CF61}" type="slidenum">
+              <a:rPr lang="en-US" sz="1400" b="0" strike="noStrike" spc="-1" smtClean="0">
+                <a:solidFill>
+                  <a:srgbClr val="000000"/>
+                </a:solidFill>
+                <a:uFill>
+                  <a:solidFill>
+                    <a:srgbClr val="FFFFFF"/>
+                  </a:solidFill>
+                </a:uFill>
+                <a:latin typeface="Times New Roman"/>
+              </a:rPr>
+              <a:t>12</a:t>
+            </a:fld>
+            <a:endParaRPr lang="en-US" sz="1400" b="0" strike="noStrike" spc="-1">
+              <a:solidFill>
+                <a:srgbClr val="000000"/>
+              </a:solidFill>
+              <a:uFill>
+                <a:solidFill>
+                  <a:srgbClr val="FFFFFF"/>
+                </a:solidFill>
+              </a:uFill>
+              <a:latin typeface="Times New Roman"/>
+            </a:endParaRPr>
+          </a:p>
+        </p:txBody>
+      </p:sp>
+    </p:spTree>
+    <p:extLst>
+      <p:ext uri="{BB962C8B-B14F-4D97-AF65-F5344CB8AC3E}">
+        <p14:creationId xmlns:p14="http://schemas.microsoft.com/office/powerpoint/2010/main" val="3503610545"/>
+      </p:ext>
+    </p:extLst>
+  </p:cSld>
+  <p:clrMapOvr>
+    <a:masterClrMapping/>
+  </p:clrMapOvr>
+</p:notes>
+</file>
+
+<file path=ppt/notesSlides/notesSlide11.xml><?xml version="1.0" encoding="utf-8"?>
+<p:notes xmlns:a="http://schemas.openxmlformats.org/drawingml/2006/main" xmlns:r="http://schemas.openxmlformats.org/officeDocument/2006/relationships" xmlns:p="http://schemas.openxmlformats.org/presentationml/2006/main">
+  <p:cSld>
+    <p:spTree>
+      <p:nvGrpSpPr>
+        <p:cNvPr id="1" name=""/>
+        <p:cNvGrpSpPr/>
+        <p:nvPr/>
+      </p:nvGrpSpPr>
+      <p:grpSpPr>
+        <a:xfrm>
+          <a:off x="0" y="0"/>
+          <a:ext cx="0" cy="0"/>
+          <a:chOff x="0" y="0"/>
+          <a:chExt cx="0" cy="0"/>
+        </a:xfrm>
+      </p:grpSpPr>
+      <p:sp>
+        <p:nvSpPr>
+          <p:cNvPr id="2" name="Slide Image Placeholder 1"/>
+          <p:cNvSpPr>
+            <a:spLocks noGrp="1" noRot="1" noChangeAspect="1"/>
+          </p:cNvSpPr>
+          <p:nvPr>
+            <p:ph type="sldImg"/>
+          </p:nvPr>
+        </p:nvSpPr>
+        <p:spPr>
+          <a:xfrm>
+            <a:off x="1497013" y="1200150"/>
+            <a:ext cx="4321175" cy="3240088"/>
+          </a:xfrm>
+          <a:prstGeom prst="rect">
+            <a:avLst/>
+          </a:prstGeom>
+          <a:noFill/>
+          <a:ln w="12700">
+            <a:solidFill>
+              <a:prstClr val="black"/>
+            </a:solidFill>
+          </a:ln>
+        </p:spPr>
+      </p:sp>
+      <p:sp>
+        <p:nvSpPr>
+          <p:cNvPr id="3" name="Notes Placeholder 2"/>
+          <p:cNvSpPr>
+            <a:spLocks noGrp="1"/>
+          </p:cNvSpPr>
+          <p:nvPr>
+            <p:ph type="body" idx="1"/>
+          </p:nvPr>
+        </p:nvSpPr>
+        <p:spPr/>
+        <p:txBody>
+          <a:bodyPr/>
+          <a:lstStyle/>
+          <a:p>
+            <a:endParaRPr lang="en-US" dirty="0"/>
+          </a:p>
+        </p:txBody>
+      </p:sp>
+      <p:sp>
+        <p:nvSpPr>
+          <p:cNvPr id="4" name="Slide Number Placeholder 3"/>
+          <p:cNvSpPr>
+            <a:spLocks noGrp="1"/>
+          </p:cNvSpPr>
+          <p:nvPr>
+            <p:ph type="sldNum"/>
+          </p:nvPr>
+        </p:nvSpPr>
+        <p:spPr/>
+        <p:txBody>
+          <a:bodyPr/>
+          <a:lstStyle/>
+          <a:p>
+            <a:pPr algn="r"/>
+            <a:fld id="{B630EBB8-CEB5-4E8D-9A06-06438377CF61}" type="slidenum">
+              <a:rPr lang="en-US" sz="1400" b="0" strike="noStrike" spc="-1" smtClean="0">
+                <a:solidFill>
+                  <a:srgbClr val="000000"/>
+                </a:solidFill>
+                <a:uFill>
+                  <a:solidFill>
+                    <a:srgbClr val="FFFFFF"/>
+                  </a:solidFill>
+                </a:uFill>
+                <a:latin typeface="Times New Roman"/>
+              </a:rPr>
+              <a:t>13</a:t>
+            </a:fld>
+            <a:endParaRPr lang="en-US" sz="1400" b="0" strike="noStrike" spc="-1">
+              <a:solidFill>
+                <a:srgbClr val="000000"/>
+              </a:solidFill>
+              <a:uFill>
+                <a:solidFill>
+                  <a:srgbClr val="FFFFFF"/>
+                </a:solidFill>
+              </a:uFill>
+              <a:latin typeface="Times New Roman"/>
+            </a:endParaRPr>
+          </a:p>
+        </p:txBody>
+      </p:sp>
+    </p:spTree>
+    <p:extLst>
+      <p:ext uri="{BB962C8B-B14F-4D97-AF65-F5344CB8AC3E}">
+        <p14:creationId xmlns:p14="http://schemas.microsoft.com/office/powerpoint/2010/main" val="2939624800"/>
+      </p:ext>
+    </p:extLst>
+  </p:cSld>
+  <p:clrMapOvr>
+    <a:masterClrMapping/>
+  </p:clrMapOvr>
+</p:notes>
+</file>
+
 <file path=ppt/notesSlides/notesSlide2.xml><?xml version="1.0" encoding="utf-8"?>
 <p:notes xmlns:a="http://schemas.openxmlformats.org/drawingml/2006/main" xmlns:r="http://schemas.openxmlformats.org/officeDocument/2006/relationships" xmlns:p="http://schemas.openxmlformats.org/presentationml/2006/main">
   <p:cSld>
@@ -1502,7 +1875,7 @@
           <a:lstStyle/>
           <a:p>
             <a:r>
-              <a:rPr lang="en-US" sz="2000" b="0" strike="noStrike" spc="-1">
+              <a:rPr lang="en-US" sz="2000" b="0" strike="noStrike" spc="-1" dirty="0">
                 <a:solidFill>
                   <a:srgbClr val="000000"/>
                 </a:solidFill>
@@ -1513,12 +1886,12 @@
                 </a:uFill>
                 <a:latin typeface="Arial"/>
               </a:rPr>
-              <a:t>Add exception handling code to GameOfLifeMain around call to loadGameState().  </a:t>
-            </a:r>
-          </a:p>
-          <a:p>
-            <a:r>
-              <a:rPr lang="en-US" sz="2000" b="0" strike="noStrike" spc="-1">
+              <a:t>When having multiple catch statements be sure to move from more specific to more general.</a:t>
+            </a:r>
+          </a:p>
+          <a:p>
+            <a:r>
+              <a:rPr lang="en-US" sz="2000" b="0" strike="noStrike" spc="-1" dirty="0">
                 <a:solidFill>
                   <a:srgbClr val="000000"/>
                 </a:solidFill>
@@ -1529,12 +1902,12 @@
                 </a:uFill>
                 <a:latin typeface="Arial"/>
               </a:rPr>
-              <a:t>Demonstrate crasher first, e.g </a:t>
-            </a:r>
-          </a:p>
-          <a:p>
-            <a:r>
-              <a:rPr lang="en-US" sz="2000" b="0" strike="noStrike" spc="-1">
+              <a:t>It is helpful to know the more specific type of exception as it may have features unknown as more a general type of exception.</a:t>
+            </a:r>
+          </a:p>
+          <a:p>
+            <a:r>
+              <a:rPr lang="en-US" sz="2000" b="0" strike="noStrike" spc="-1" dirty="0">
                 <a:solidFill>
                   <a:srgbClr val="000000"/>
                 </a:solidFill>
@@ -1545,12 +1918,10 @@
                 </a:uFill>
                 <a:latin typeface="Arial"/>
               </a:rPr>
-              <a:t>- use the name of a file that does not exist</a:t>
-            </a:r>
-          </a:p>
-          <a:p>
-            <a:r>
-              <a:rPr lang="en-US" sz="2000" b="0" strike="noStrike" spc="-1">
+              <a:t>The first catch that matches the type will be the only one that </a:t>
+            </a:r>
+            <a:r>
+              <a:rPr lang="en-US" sz="2000" b="0" strike="noStrike" spc="-1" dirty="0" err="1">
                 <a:solidFill>
                   <a:srgbClr val="000000"/>
                 </a:solidFill>
@@ -1561,24 +1932,19 @@
                 </a:uFill>
                 <a:latin typeface="Arial"/>
               </a:rPr>
-              <a:t>- demo a bad input file (See FilesAndExceptiosn/badInput.txt)</a:t>
-            </a:r>
-          </a:p>
-          <a:p>
-            <a:r>
-              <a:rPr lang="en-US" sz="2000" b="0" strike="noStrike" spc="-1">
-                <a:solidFill>
-                  <a:srgbClr val="000000"/>
-                </a:solidFill>
-                <a:uFill>
-                  <a:solidFill>
-                    <a:srgbClr val="FFFFFF"/>
-                  </a:solidFill>
-                </a:uFill>
-                <a:latin typeface="Arial"/>
-              </a:rPr>
-              <a:t>Note: There is a file FilesAndExceptions/AcornInput.txt</a:t>
-            </a:r>
+              <a:t>excecutes</a:t>
+            </a:r>
+            <a:endParaRPr lang="en-US" sz="2000" b="0" strike="noStrike" spc="-1" dirty="0">
+              <a:solidFill>
+                <a:srgbClr val="000000"/>
+              </a:solidFill>
+              <a:uFill>
+                <a:solidFill>
+                  <a:srgbClr val="FFFFFF"/>
+                </a:solidFill>
+              </a:uFill>
+              <a:latin typeface="Arial"/>
+            </a:endParaRPr>
           </a:p>
         </p:txBody>
       </p:sp>
@@ -1699,7 +2065,7 @@
           <a:lstStyle/>
           <a:p>
             <a:r>
-              <a:rPr lang="en-US" sz="2000" b="0" strike="noStrike" spc="-1">
+              <a:rPr lang="en-US" sz="2000" b="0" strike="noStrike" spc="-1" dirty="0">
                 <a:solidFill>
                   <a:srgbClr val="000000"/>
                 </a:solidFill>
@@ -1710,12 +2076,12 @@
                 </a:uFill>
                 <a:latin typeface="Arial"/>
               </a:rPr>
-              <a:t>Add exception handling code to GameOfLifeMain around call to loadGameState().  </a:t>
-            </a:r>
-          </a:p>
-          <a:p>
-            <a:r>
-              <a:rPr lang="en-US" sz="2000" b="0" strike="noStrike" spc="-1">
+              <a:t>0:35-0:40 work time</a:t>
+            </a:r>
+          </a:p>
+          <a:p>
+            <a:r>
+              <a:rPr lang="en-US" sz="2000" b="0" strike="noStrike" spc="-1" dirty="0">
                 <a:solidFill>
                   <a:srgbClr val="000000"/>
                 </a:solidFill>
@@ -1726,55 +2092,7 @@
                 </a:uFill>
                 <a:latin typeface="Arial"/>
               </a:rPr>
-              <a:t>Demonstrate crasher first, e.g </a:t>
-            </a:r>
-          </a:p>
-          <a:p>
-            <a:r>
-              <a:rPr lang="en-US" sz="2000" b="0" strike="noStrike" spc="-1">
-                <a:solidFill>
-                  <a:srgbClr val="000000"/>
-                </a:solidFill>
-                <a:uFill>
-                  <a:solidFill>
-                    <a:srgbClr val="FFFFFF"/>
-                  </a:solidFill>
-                </a:uFill>
-                <a:latin typeface="Arial"/>
-              </a:rPr>
-              <a:t>- use the name of a file that does not exist</a:t>
-            </a:r>
-          </a:p>
-          <a:p>
-            <a:r>
-              <a:rPr lang="en-US" sz="2000" b="0" strike="noStrike" spc="-1">
-                <a:solidFill>
-                  <a:srgbClr val="000000"/>
-                </a:solidFill>
-                <a:uFill>
-                  <a:solidFill>
-                    <a:srgbClr val="FFFFFF"/>
-                  </a:solidFill>
-                </a:uFill>
-                <a:latin typeface="Arial"/>
-              </a:rPr>
-              <a:t>- demo a bad input file (See FilesAndExceptiosn/badInput.txt)</a:t>
-            </a:r>
-          </a:p>
-          <a:p>
-            <a:r>
-              <a:rPr lang="en-US" sz="2000" b="0" strike="noStrike" spc="-1">
-                <a:solidFill>
-                  <a:srgbClr val="000000"/>
-                </a:solidFill>
-                <a:uFill>
-                  <a:solidFill>
-                    <a:srgbClr val="FFFFFF"/>
-                  </a:solidFill>
-                </a:uFill>
-                <a:latin typeface="Arial"/>
-              </a:rPr>
-              <a:t>Note: There is a file FilesAndExceptions/AcornInput.txt</a:t>
+              <a:t>0:40-0:45 walkthrough part of the solution (use ink drawing mode to draw on the PPT screen)</a:t>
             </a:r>
           </a:p>
         </p:txBody>
@@ -7471,8 +7789,8 @@
         </p:nvSpPr>
         <p:spPr>
           <a:xfrm>
-            <a:off x="457200" y="1600200"/>
-            <a:ext cx="8228520" cy="4524840"/>
+            <a:off x="75304" y="1600200"/>
+            <a:ext cx="9068696" cy="4524840"/>
           </a:xfrm>
           <a:prstGeom prst="rect">
             <a:avLst/>
@@ -7509,7 +7827,7 @@
               <a:buChar char="•"/>
             </a:pPr>
             <a:r>
-              <a:rPr lang="en-US" sz="3200" b="0" strike="noStrike" spc="-1">
+              <a:rPr lang="en-US" sz="3200" b="0" strike="noStrike" spc="-1" dirty="0">
                 <a:solidFill>
                   <a:srgbClr val="000000"/>
                 </a:solidFill>
@@ -7524,7 +7842,7 @@
               <a:t>Look at the code in </a:t>
             </a:r>
             <a:r>
-              <a:rPr lang="en-US" sz="3200" b="0" strike="noStrike" spc="-1" err="1">
+              <a:rPr lang="en-US" sz="3200" b="0" strike="noStrike" spc="-1" dirty="0" err="1">
                 <a:solidFill>
                   <a:srgbClr val="000000"/>
                 </a:solidFill>
@@ -7539,7 +7857,7 @@
               <a:t>FileAverage</a:t>
             </a:r>
             <a:r>
-              <a:rPr lang="en-US" sz="3200" b="0" strike="noStrike" spc="-1">
+              <a:rPr lang="en-US" sz="3200" b="0" strike="noStrike" spc="-1" dirty="0">
                 <a:solidFill>
                   <a:srgbClr val="000000"/>
                 </a:solidFill>
@@ -7553,7 +7871,7 @@
               </a:rPr>
               <a:t>, focusing on the use of exceptions</a:t>
             </a:r>
-            <a:endParaRPr lang="en-US" sz="1800" b="0" strike="noStrike" spc="-1">
+            <a:endParaRPr lang="en-US" sz="1800" b="0" strike="noStrike" spc="-1" dirty="0">
               <a:solidFill>
                 <a:srgbClr val="000000"/>
               </a:solidFill>
@@ -7577,7 +7895,7 @@
               <a:buChar char="•"/>
             </a:pPr>
             <a:r>
-              <a:rPr lang="en-US" sz="3200" b="0" strike="noStrike" spc="-1">
+              <a:rPr lang="en-US" sz="3200" b="0" strike="noStrike" spc="-1" dirty="0">
                 <a:solidFill>
                   <a:srgbClr val="000000"/>
                 </a:solidFill>
@@ -7592,7 +7910,7 @@
               <a:t>Solve the problems in </a:t>
             </a:r>
             <a:r>
-              <a:rPr lang="en-US" sz="3200" b="0" strike="noStrike" spc="-1" err="1">
+              <a:rPr lang="en-US" sz="3200" b="0" strike="noStrike" spc="-1" dirty="0" err="1">
                 <a:solidFill>
                   <a:srgbClr val="000000"/>
                 </a:solidFill>
@@ -7606,16 +7924,260 @@
               </a:rPr>
               <a:t>FileBestScore</a:t>
             </a:r>
-            <a:endParaRPr lang="en-US" sz="1800" b="0" strike="noStrike" spc="-1">
-              <a:solidFill>
-                <a:srgbClr val="000000"/>
-              </a:solidFill>
-              <a:uFill>
-                <a:solidFill>
-                  <a:srgbClr val="FFFFFF"/>
-                </a:solidFill>
-              </a:uFill>
-              <a:latin typeface="Arial"/>
+            <a:endParaRPr lang="en-US" sz="3200" b="0" strike="noStrike" spc="-1" dirty="0">
+              <a:solidFill>
+                <a:srgbClr val="000000"/>
+              </a:solidFill>
+              <a:uFill>
+                <a:solidFill>
+                  <a:srgbClr val="FFFFFF"/>
+                </a:solidFill>
+              </a:uFill>
+              <a:latin typeface="Calibri"/>
+              <a:ea typeface="DejaVu Sans"/>
+            </a:endParaRPr>
+          </a:p>
+          <a:p>
+            <a:pPr marL="343080" indent="-342000">
+              <a:lnSpc>
+                <a:spcPct val="100000"/>
+              </a:lnSpc>
+              <a:buClr>
+                <a:srgbClr val="000000"/>
+              </a:buClr>
+              <a:buFont typeface="Arial"/>
+              <a:buChar char="•"/>
+            </a:pPr>
+            <a:endParaRPr lang="en-US" sz="3200" b="0" strike="noStrike" spc="-1" dirty="0">
+              <a:solidFill>
+                <a:srgbClr val="000000"/>
+              </a:solidFill>
+              <a:uFill>
+                <a:solidFill>
+                  <a:srgbClr val="FFFFFF"/>
+                </a:solidFill>
+              </a:uFill>
+              <a:latin typeface="Calibri"/>
+              <a:ea typeface="DejaVu Sans"/>
+            </a:endParaRPr>
+          </a:p>
+          <a:p>
+            <a:pPr marL="343080" indent="-342000">
+              <a:lnSpc>
+                <a:spcPct val="100000"/>
+              </a:lnSpc>
+              <a:buClr>
+                <a:srgbClr val="000000"/>
+              </a:buClr>
+              <a:buFont typeface="Arial"/>
+              <a:buChar char="•"/>
+            </a:pPr>
+            <a:r>
+              <a:rPr lang="en-US" sz="3200" spc="-1" dirty="0">
+                <a:solidFill>
+                  <a:srgbClr val="000000"/>
+                </a:solidFill>
+                <a:uFill>
+                  <a:solidFill>
+                    <a:srgbClr val="FFFFFF"/>
+                  </a:solidFill>
+                </a:uFill>
+                <a:latin typeface="Calibri"/>
+                <a:ea typeface="DejaVu Sans"/>
+              </a:rPr>
+              <a:t>Be sure to read the instructions carefully:</a:t>
+            </a:r>
+          </a:p>
+          <a:p>
+            <a:pPr algn="l"/>
+            <a:r>
+              <a:rPr lang="en-US" sz="1600" dirty="0">
+                <a:solidFill>
+                  <a:srgbClr val="3F5FBF"/>
+                </a:solidFill>
+                <a:latin typeface="Consolas" panose="020B0609020204030204" pitchFamily="49" charset="0"/>
+              </a:rPr>
+              <a:t> *  1.  Cheating players sometimes do more than 4 rounds.  The program should</a:t>
+            </a:r>
+          </a:p>
+          <a:p>
+            <a:pPr algn="l"/>
+            <a:r>
+              <a:rPr lang="en-US" sz="1600" dirty="0">
+                <a:solidFill>
+                  <a:srgbClr val="3F5FBF"/>
+                </a:solidFill>
+                <a:latin typeface="Consolas" panose="020B0609020204030204" pitchFamily="49" charset="0"/>
+              </a:rPr>
+              <a:t> * print a warning when a cheating player is uncovered </a:t>
+            </a:r>
+            <a:r>
+              <a:rPr lang="en-US" sz="1600" dirty="0">
+                <a:solidFill>
+                  <a:srgbClr val="7F7F9F"/>
+                </a:solidFill>
+                <a:latin typeface="Consolas" panose="020B0609020204030204" pitchFamily="49" charset="0"/>
+              </a:rPr>
+              <a:t>-</a:t>
+            </a:r>
+            <a:r>
+              <a:rPr lang="en-US" sz="1600" dirty="0">
+                <a:solidFill>
+                  <a:srgbClr val="3F5FBF"/>
+                </a:solidFill>
+                <a:latin typeface="Consolas" panose="020B0609020204030204" pitchFamily="49" charset="0"/>
+              </a:rPr>
+              <a:t> but continue the</a:t>
+            </a:r>
+          </a:p>
+          <a:p>
+            <a:pPr algn="l"/>
+            <a:r>
+              <a:rPr lang="en-US" sz="1600" dirty="0">
+                <a:solidFill>
+                  <a:srgbClr val="3F5FBF"/>
+                </a:solidFill>
+                <a:latin typeface="Consolas" panose="020B0609020204030204" pitchFamily="49" charset="0"/>
+              </a:rPr>
+              <a:t> * computation ignoring the cheating player.  </a:t>
+            </a:r>
+          </a:p>
+          <a:p>
+            <a:pPr algn="l"/>
+            <a:r>
+              <a:rPr lang="en-US" sz="1600" dirty="0">
+                <a:solidFill>
+                  <a:srgbClr val="3F5FBF"/>
+                </a:solidFill>
+                <a:latin typeface="Consolas" panose="020B0609020204030204" pitchFamily="49" charset="0"/>
+              </a:rPr>
+              <a:t> * </a:t>
+            </a:r>
+          </a:p>
+          <a:p>
+            <a:pPr algn="l"/>
+            <a:r>
+              <a:rPr lang="en-US" sz="1600" dirty="0">
+                <a:solidFill>
+                  <a:srgbClr val="3F5FBF"/>
+                </a:solidFill>
+                <a:latin typeface="Consolas" panose="020B0609020204030204" pitchFamily="49" charset="0"/>
+              </a:rPr>
+              <a:t> * Do this by making the function </a:t>
+            </a:r>
+            <a:r>
+              <a:rPr lang="en-US" sz="1600" b="1" u="sng" dirty="0" err="1">
+                <a:solidFill>
+                  <a:srgbClr val="3F5FBF"/>
+                </a:solidFill>
+                <a:highlight>
+                  <a:srgbClr val="FFFF00"/>
+                </a:highlight>
+                <a:latin typeface="Consolas" panose="020B0609020204030204" pitchFamily="49" charset="0"/>
+              </a:rPr>
+              <a:t>computeTotal</a:t>
+            </a:r>
+            <a:r>
+              <a:rPr lang="en-US" sz="1600" b="1" u="sng" dirty="0">
+                <a:solidFill>
+                  <a:srgbClr val="3F5FBF"/>
+                </a:solidFill>
+                <a:highlight>
+                  <a:srgbClr val="FFFF00"/>
+                </a:highlight>
+                <a:latin typeface="Consolas" panose="020B0609020204030204" pitchFamily="49" charset="0"/>
+              </a:rPr>
+              <a:t> throw a </a:t>
+            </a:r>
+            <a:r>
+              <a:rPr lang="en-US" sz="1600" b="1" u="sng" dirty="0" err="1">
+                <a:solidFill>
+                  <a:srgbClr val="3F5FBF"/>
+                </a:solidFill>
+                <a:highlight>
+                  <a:srgbClr val="FFFF00"/>
+                </a:highlight>
+                <a:latin typeface="Consolas" panose="020B0609020204030204" pitchFamily="49" charset="0"/>
+              </a:rPr>
+              <a:t>IllegalArgumentException</a:t>
+            </a:r>
+            <a:endParaRPr lang="en-US" sz="1600" b="1" u="sng" dirty="0">
+              <a:solidFill>
+                <a:srgbClr val="3F5FBF"/>
+              </a:solidFill>
+              <a:highlight>
+                <a:srgbClr val="FFFF00"/>
+              </a:highlight>
+              <a:latin typeface="Consolas" panose="020B0609020204030204" pitchFamily="49" charset="0"/>
+            </a:endParaRPr>
+          </a:p>
+          <a:p>
+            <a:pPr algn="l"/>
+            <a:r>
+              <a:rPr lang="en-US" sz="1600" dirty="0">
+                <a:solidFill>
+                  <a:srgbClr val="3F5FBF"/>
+                </a:solidFill>
+                <a:latin typeface="Consolas" panose="020B0609020204030204" pitchFamily="49" charset="0"/>
+              </a:rPr>
+              <a:t> * when given a cheating record.  </a:t>
+            </a:r>
+            <a:r>
+              <a:rPr lang="en-US" sz="1600" b="1" u="sng" dirty="0" err="1">
+                <a:solidFill>
+                  <a:srgbClr val="3F5FBF"/>
+                </a:solidFill>
+                <a:highlight>
+                  <a:srgbClr val="FFFF00"/>
+                </a:highlight>
+                <a:latin typeface="Consolas" panose="020B0609020204030204" pitchFamily="49" charset="0"/>
+              </a:rPr>
+              <a:t>computeBestScore</a:t>
+            </a:r>
+            <a:r>
+              <a:rPr lang="en-US" sz="1600" b="1" u="sng" dirty="0">
+                <a:solidFill>
+                  <a:srgbClr val="3F5FBF"/>
+                </a:solidFill>
+                <a:highlight>
+                  <a:srgbClr val="FFFF00"/>
+                </a:highlight>
+                <a:latin typeface="Consolas" panose="020B0609020204030204" pitchFamily="49" charset="0"/>
+              </a:rPr>
+              <a:t> should catch the exception</a:t>
+            </a:r>
+            <a:r>
+              <a:rPr lang="en-US" sz="1600" dirty="0">
+                <a:solidFill>
+                  <a:srgbClr val="3F5FBF"/>
+                </a:solidFill>
+                <a:latin typeface="Consolas" panose="020B0609020204030204" pitchFamily="49" charset="0"/>
+              </a:rPr>
+              <a:t>,</a:t>
+            </a:r>
+          </a:p>
+          <a:p>
+            <a:pPr algn="l"/>
+            <a:r>
+              <a:rPr lang="en-US" sz="1600" dirty="0">
+                <a:solidFill>
+                  <a:srgbClr val="3F5FBF"/>
+                </a:solidFill>
+                <a:latin typeface="Consolas" panose="020B0609020204030204" pitchFamily="49" charset="0"/>
+              </a:rPr>
+              <a:t> * print a warning, and continue the computation.</a:t>
+            </a:r>
+            <a:endParaRPr lang="en-US" sz="3600" b="0" strike="noStrike" spc="-1" dirty="0">
+              <a:solidFill>
+                <a:srgbClr val="000000"/>
+              </a:solidFill>
+              <a:uFill>
+                <a:solidFill>
+                  <a:srgbClr val="FFFFFF"/>
+                </a:solidFill>
+              </a:uFill>
+              <a:latin typeface="Calibri"/>
+              <a:ea typeface="DejaVu Sans"/>
             </a:endParaRPr>
           </a:p>
         </p:txBody>
@@ -7652,6 +8214,142 @@
       </p:par>
     </p:tnLst>
   </p:timing>
+</p:sld>
+</file>
+
+<file path=ppt/slides/slide13.xml><?xml version="1.0" encoding="utf-8"?>
+<p:sld xmlns:a="http://schemas.openxmlformats.org/drawingml/2006/main" xmlns:r="http://schemas.openxmlformats.org/officeDocument/2006/relationships" xmlns:p="http://schemas.openxmlformats.org/presentationml/2006/main">
+  <p:cSld>
+    <p:spTree>
+      <p:nvGrpSpPr>
+        <p:cNvPr id="1" name=""/>
+        <p:cNvGrpSpPr/>
+        <p:nvPr/>
+      </p:nvGrpSpPr>
+      <p:grpSpPr>
+        <a:xfrm>
+          <a:off x="0" y="0"/>
+          <a:ext cx="0" cy="0"/>
+          <a:chOff x="0" y="0"/>
+          <a:chExt cx="0" cy="0"/>
+        </a:xfrm>
+      </p:grpSpPr>
+      <p:sp>
+        <p:nvSpPr>
+          <p:cNvPr id="2" name="Title 1">
+            <a:extLst>
+              <a:ext uri="{FF2B5EF4-FFF2-40B4-BE49-F238E27FC236}">
+                <a16:creationId xmlns:a16="http://schemas.microsoft.com/office/drawing/2014/main" id="{AD932DFD-9C15-7FAC-BF2C-D2E3FE7A812F}"/>
+              </a:ext>
+            </a:extLst>
+          </p:cNvPr>
+          <p:cNvSpPr>
+            <a:spLocks noGrp="1"/>
+          </p:cNvSpPr>
+          <p:nvPr>
+            <p:ph type="title"/>
+          </p:nvPr>
+        </p:nvSpPr>
+        <p:spPr/>
+        <p:txBody>
+          <a:bodyPr/>
+          <a:lstStyle/>
+          <a:p>
+            <a:r>
+              <a:rPr lang="en-US" dirty="0"/>
+              <a:t>From Milestone 1 Requirements</a:t>
+            </a:r>
+            <a:br>
+              <a:rPr lang="en-US" dirty="0"/>
+            </a:br>
+            <a:endParaRPr lang="en-US" dirty="0"/>
+          </a:p>
+        </p:txBody>
+      </p:sp>
+      <p:sp>
+        <p:nvSpPr>
+          <p:cNvPr id="3" name="Subtitle 2">
+            <a:extLst>
+              <a:ext uri="{FF2B5EF4-FFF2-40B4-BE49-F238E27FC236}">
+                <a16:creationId xmlns:a16="http://schemas.microsoft.com/office/drawing/2014/main" id="{69A103E3-E27A-D95A-A260-87280C85FB38}"/>
+              </a:ext>
+            </a:extLst>
+          </p:cNvPr>
+          <p:cNvSpPr>
+            <a:spLocks noGrp="1"/>
+          </p:cNvSpPr>
+          <p:nvPr>
+            <p:ph type="subTitle"/>
+          </p:nvPr>
+        </p:nvSpPr>
+        <p:spPr>
+          <a:xfrm>
+            <a:off x="544943" y="4305292"/>
+            <a:ext cx="8053753" cy="1668026"/>
+          </a:xfrm>
+        </p:spPr>
+        <p:txBody>
+          <a:bodyPr/>
+          <a:lstStyle/>
+          <a:p>
+            <a:r>
+              <a:rPr lang="en-US" dirty="0"/>
+              <a:t>You may want to brainstorm with your team.</a:t>
+            </a:r>
+          </a:p>
+          <a:p>
+            <a:r>
+              <a:rPr lang="en-US" dirty="0"/>
+              <a:t>What kind of exceptions that should occur?</a:t>
+            </a:r>
+          </a:p>
+          <a:p>
+            <a:r>
+              <a:rPr lang="en-US" dirty="0"/>
+              <a:t>What should happen when they occur?</a:t>
+            </a:r>
+          </a:p>
+        </p:txBody>
+      </p:sp>
+      <p:pic>
+        <p:nvPicPr>
+          <p:cNvPr id="4" name="Picture 3">
+            <a:extLst>
+              <a:ext uri="{FF2B5EF4-FFF2-40B4-BE49-F238E27FC236}">
+                <a16:creationId xmlns:a16="http://schemas.microsoft.com/office/drawing/2014/main" id="{A9EECB26-34C6-57B9-88EE-E87D1C4806AC}"/>
+              </a:ext>
+            </a:extLst>
+          </p:cNvPr>
+          <p:cNvPicPr>
+            <a:picLocks noChangeAspect="1"/>
+          </p:cNvPicPr>
+          <p:nvPr/>
+        </p:nvPicPr>
+        <p:blipFill rotWithShape="1">
+          <a:blip r:embed="rId3"/>
+          <a:srcRect l="3872"/>
+          <a:stretch/>
+        </p:blipFill>
+        <p:spPr>
+          <a:xfrm>
+            <a:off x="103138" y="1258951"/>
+            <a:ext cx="8937724" cy="2510149"/>
+          </a:xfrm>
+          <a:prstGeom prst="rect">
+            <a:avLst/>
+          </a:prstGeom>
+        </p:spPr>
+      </p:pic>
+    </p:spTree>
+    <p:extLst>
+      <p:ext uri="{BB962C8B-B14F-4D97-AF65-F5344CB8AC3E}">
+        <p14:creationId xmlns:p14="http://schemas.microsoft.com/office/powerpoint/2010/main" val="2054310034"/>
+      </p:ext>
+    </p:extLst>
+  </p:cSld>
+  <p:clrMapOvr>
+    <a:masterClrMapping/>
+  </p:clrMapOvr>
 </p:sld>
 </file>
 
@@ -13196,6 +13894,13 @@
           </a:effectRef>
           <a:fontRef idx="minor"/>
         </p:style>
+        <p:txBody>
+          <a:bodyPr/>
+          <a:lstStyle/>
+          <a:p>
+            <a:endParaRPr lang="en-US"/>
+          </a:p>
+        </p:txBody>
       </p:sp>
       <p:sp>
         <p:nvSpPr>
@@ -13442,6 +14147,13 @@
           </a:effectRef>
           <a:fontRef idx="minor"/>
         </p:style>
+        <p:txBody>
+          <a:bodyPr/>
+          <a:lstStyle/>
+          <a:p>
+            <a:endParaRPr lang="en-US"/>
+          </a:p>
+        </p:txBody>
       </p:sp>
     </p:spTree>
   </p:cSld>
@@ -15703,15 +16415,6 @@
 </file>
 
 <file path=customXml/item2.xml><?xml version="1.0" encoding="utf-8"?>
-<?mso-contentType ?>
-<FormTemplates xmlns="http://schemas.microsoft.com/sharepoint/v3/contenttype/forms">
-  <Display>DocumentLibraryForm</Display>
-  <Edit>DocumentLibraryForm</Edit>
-  <New>DocumentLibraryForm</New>
-</FormTemplates>
-</file>
-
-<file path=customXml/item3.xml><?xml version="1.0" encoding="utf-8"?>
 <ct:contentTypeSchema xmlns:ct="http://schemas.microsoft.com/office/2006/metadata/contentType" xmlns:ma="http://schemas.microsoft.com/office/2006/metadata/properties/metaAttributes" ct:_="" ma:_="" ma:contentTypeName="Document" ma:contentTypeID="0x0101004285D81DBE5F5A448E892B34D6B8CF20" ma:contentTypeVersion="8" ma:contentTypeDescription="Create a new document." ma:contentTypeScope="" ma:versionID="ecce54155d2ea7caa9aed06c8b6b9867">
   <xsd:schema xmlns:xsd="http://www.w3.org/2001/XMLSchema" xmlns:xs="http://www.w3.org/2001/XMLSchema" xmlns:p="http://schemas.microsoft.com/office/2006/metadata/properties" xmlns:ns2="08600313-7276-4ca7-b5d3-7d86193ee0ac" xmlns:ns3="820f9cb1-409d-4c4b-8197-1d4f7dd48124" targetNamespace="http://schemas.microsoft.com/office/2006/metadata/properties" ma:root="true" ma:fieldsID="bfd7385540b70b2fe84ac888cc214377" ns2:_="" ns3:_="">
     <xsd:import namespace="08600313-7276-4ca7-b5d3-7d86193ee0ac"/>
@@ -15888,6 +16591,15 @@
 </ct:contentTypeSchema>
 </file>
 
+<file path=customXml/item3.xml><?xml version="1.0" encoding="utf-8"?>
+<?mso-contentType ?>
+<FormTemplates xmlns="http://schemas.microsoft.com/sharepoint/v3/contenttype/forms">
+  <Display>DocumentLibraryForm</Display>
+  <Edit>DocumentLibraryForm</Edit>
+  <New>DocumentLibraryForm</New>
+</FormTemplates>
+</file>
+
 <file path=customXml/itemProps1.xml><?xml version="1.0" encoding="utf-8"?>
 <ds:datastoreItem xmlns:ds="http://schemas.openxmlformats.org/officeDocument/2006/customXml" ds:itemID="{FBC30A03-96C5-4843-A046-F16D54BDCFE9}">
   <ds:schemaRefs>
@@ -15900,14 +16612,6 @@
 </file>
 
 <file path=customXml/itemProps2.xml><?xml version="1.0" encoding="utf-8"?>
-<ds:datastoreItem xmlns:ds="http://schemas.openxmlformats.org/officeDocument/2006/customXml" ds:itemID="{3B957A52-5263-4C13-94EC-BADD6AC559B8}">
-  <ds:schemaRefs>
-    <ds:schemaRef ds:uri="http://schemas.microsoft.com/sharepoint/v3/contenttype/forms"/>
-  </ds:schemaRefs>
-</ds:datastoreItem>
-</file>
-
-<file path=customXml/itemProps3.xml><?xml version="1.0" encoding="utf-8"?>
 <ds:datastoreItem xmlns:ds="http://schemas.openxmlformats.org/officeDocument/2006/customXml" ds:itemID="{74EDD9DE-4993-48BD-A320-B7ED6C251005}">
   <ds:schemaRefs>
     <ds:schemaRef ds:uri="http://schemas.microsoft.com/office/2006/metadata/contentType"/>
@@ -15924,4 +16628,12 @@
     <ds:schemaRef ds:uri="http://schemas.microsoft.com/internal/obd"/>
   </ds:schemaRefs>
 </ds:datastoreItem>
+</file>
+
+<file path=customXml/itemProps3.xml><?xml version="1.0" encoding="utf-8"?>
+<ds:datastoreItem xmlns:ds="http://schemas.openxmlformats.org/officeDocument/2006/customXml" ds:itemID="{3B957A52-5263-4C13-94EC-BADD6AC559B8}">
+  <ds:schemaRefs>
+    <ds:schemaRef ds:uri="http://schemas.microsoft.com/sharepoint/v3/contenttype/forms"/>
+  </ds:schemaRefs>
+</ds:datastoreItem>
 </file>
</xml_diff>

<commit_message>
remove old presentation rubric
</commit_message>
<xml_diff>
--- a/ClassMaterials/OOAndExceptions/Slides/Part3-ExceptionHandling.pptx
+++ b/ClassMaterials/OOAndExceptions/Slides/Part3-ExceptionHandling.pptx
@@ -6,7 +6,7 @@
     <p:sldMasterId id="2147483661" r:id="rId5"/>
   </p:sldMasterIdLst>
   <p:notesMasterIdLst>
-    <p:notesMasterId r:id="rId19"/>
+    <p:notesMasterId r:id="rId20"/>
   </p:notesMasterIdLst>
   <p:sldIdLst>
     <p:sldId id="256" r:id="rId6"/>
@@ -21,7 +21,8 @@
     <p:sldId id="271" r:id="rId15"/>
     <p:sldId id="284" r:id="rId16"/>
     <p:sldId id="272" r:id="rId17"/>
-    <p:sldId id="285" r:id="rId18"/>
+    <p:sldId id="286" r:id="rId18"/>
+    <p:sldId id="285" r:id="rId19"/>
   </p:sldIdLst>
   <p:sldSz cx="9144000" cy="6858000" type="screen4x3"/>
   <p:notesSz cx="7315200" cy="9601200"/>
@@ -770,7 +771,7 @@
           <a:p>
             <a:r>
               <a:rPr lang="en-US" dirty="0"/>
-              <a:t>0:45-0:53</a:t>
+              <a:t>0:41-0:49</a:t>
             </a:r>
           </a:p>
           <a:p>
@@ -976,7 +977,7 @@
                 </a:uFill>
                 <a:latin typeface="Times New Roman"/>
               </a:rPr>
-              <a:t>13</a:t>
+              <a:t>14</a:t>
             </a:fld>
             <a:endParaRPr lang="en-US" sz="1400" b="0" strike="noStrike" spc="-1">
               <a:solidFill>
@@ -2076,7 +2077,7 @@
                 </a:uFill>
                 <a:latin typeface="Arial"/>
               </a:rPr>
-              <a:t>0:35-0:40 work time</a:t>
+              <a:t>0:28-0:35 work time</a:t>
             </a:r>
           </a:p>
           <a:p>
@@ -2092,7 +2093,7 @@
                 </a:uFill>
                 <a:latin typeface="Arial"/>
               </a:rPr>
-              <a:t>0:40-0:45 walkthrough part of the solution (use ink drawing mode to draw on the PPT screen)</a:t>
+              <a:t>0:36-0:40 walkthrough part of the solution (use ink drawing mode to draw on the PPT screen)</a:t>
             </a:r>
           </a:p>
         </p:txBody>
@@ -6544,8 +6545,8 @@
         </p:nvSpPr>
         <p:spPr>
           <a:xfrm>
-            <a:off x="304260" y="4820820"/>
-            <a:ext cx="8534400" cy="1751400"/>
+            <a:off x="304260" y="5103420"/>
+            <a:ext cx="8534400" cy="1468800"/>
           </a:xfrm>
           <a:prstGeom prst="rect">
             <a:avLst/>
@@ -6618,17 +6619,6 @@
             <a:r>
               <a:rPr lang="en-US" sz="2400" i="1" dirty="0" err="1"/>
               <a:t>PracticeFilesAndExceptionsSolution</a:t>
-            </a:r>
-            <a:endParaRPr lang="en-US" sz="2400" i="1" dirty="0"/>
-          </a:p>
-          <a:p>
-            <a:pPr marL="342900" indent="-342900">
-              <a:buFont typeface="Arial" panose="020B0604020202020204" pitchFamily="34" charset="0"/>
-              <a:buChar char="•"/>
-            </a:pPr>
-            <a:r>
-              <a:rPr lang="en-US" sz="2400" i="1"/>
-              <a:t>PracticeFilesAndExceptionsTooManyScoresSolution</a:t>
             </a:r>
             <a:endParaRPr lang="en-US" sz="2400" i="1" dirty="0"/>
           </a:p>
@@ -7753,7 +7743,7 @@
               </a:lnSpc>
             </a:pPr>
             <a:r>
-              <a:rPr lang="en-US" sz="4400" b="0" strike="noStrike" spc="-1">
+              <a:rPr lang="en-US" sz="4400" b="0" strike="noStrike" spc="-1" dirty="0">
                 <a:solidFill>
                   <a:srgbClr val="000000"/>
                 </a:solidFill>
@@ -7765,9 +7755,9 @@
                 <a:latin typeface="Calibri"/>
                 <a:ea typeface="DejaVu Sans"/>
               </a:rPr>
-              <a:t>Exception Activity</a:t>
-            </a:r>
-            <a:endParaRPr lang="en-US" sz="1800" b="0" strike="noStrike" spc="-1">
+              <a:t>Exception Activity – Part 1</a:t>
+            </a:r>
+            <a:endParaRPr lang="en-US" sz="1800" b="0" strike="noStrike" spc="-1" dirty="0">
               <a:solidFill>
                 <a:srgbClr val="000000"/>
               </a:solidFill>
@@ -7789,7 +7779,7 @@
         </p:nvSpPr>
         <p:spPr>
           <a:xfrm>
-            <a:off x="75304" y="1600200"/>
+            <a:off x="75304" y="1166580"/>
             <a:ext cx="9068696" cy="4524840"/>
           </a:xfrm>
           <a:prstGeom prst="rect">
@@ -8166,6 +8156,117 @@
                 <a:latin typeface="Consolas" panose="020B0609020204030204" pitchFamily="49" charset="0"/>
               </a:rPr>
               <a:t> * print a warning, and continue the computation.</a:t>
+            </a:r>
+          </a:p>
+          <a:p>
+            <a:pPr algn="l"/>
+            <a:r>
+              <a:rPr lang="en-US" sz="1800" dirty="0">
+                <a:solidFill>
+                  <a:srgbClr val="3F5FBF"/>
+                </a:solidFill>
+                <a:latin typeface="Consolas" panose="020B0609020204030204" pitchFamily="49" charset="0"/>
+              </a:rPr>
+              <a:t> *</a:t>
+            </a:r>
+            <a:endParaRPr lang="en-US" sz="1600" dirty="0">
+              <a:solidFill>
+                <a:srgbClr val="3F5FBF"/>
+              </a:solidFill>
+              <a:latin typeface="Consolas" panose="020B0609020204030204" pitchFamily="49" charset="0"/>
+            </a:endParaRPr>
+          </a:p>
+          <a:p>
+            <a:pPr algn="l"/>
+            <a:r>
+              <a:rPr lang="en-US" sz="1600" dirty="0">
+                <a:solidFill>
+                  <a:srgbClr val="3F5FBF"/>
+                </a:solidFill>
+                <a:latin typeface="Consolas" panose="020B0609020204030204" pitchFamily="49" charset="0"/>
+              </a:rPr>
+              <a:t> * 2. If the user enters an invalid file name, the program crashes. Instead the</a:t>
+            </a:r>
+          </a:p>
+          <a:p>
+            <a:pPr algn="l"/>
+            <a:r>
+              <a:rPr lang="en-US" sz="1600" dirty="0">
+                <a:solidFill>
+                  <a:srgbClr val="3F5FBF"/>
+                </a:solidFill>
+                <a:latin typeface="Consolas" panose="020B0609020204030204" pitchFamily="49" charset="0"/>
+              </a:rPr>
+              <a:t> * program should say that the file does not exist and let the user enter a new</a:t>
+            </a:r>
+          </a:p>
+          <a:p>
+            <a:pPr algn="l"/>
+            <a:r>
+              <a:rPr lang="en-US" sz="1600" dirty="0">
+                <a:solidFill>
+                  <a:srgbClr val="3F5FBF"/>
+                </a:solidFill>
+                <a:latin typeface="Consolas" panose="020B0609020204030204" pitchFamily="49" charset="0"/>
+              </a:rPr>
+              <a:t> * name (as many times as necessary). </a:t>
+            </a:r>
+            <a:r>
+              <a:rPr lang="en-US" sz="1600" dirty="0">
+                <a:solidFill>
+                  <a:srgbClr val="3F5FBF"/>
+                </a:solidFill>
+                <a:highlight>
+                  <a:srgbClr val="FFFF00"/>
+                </a:highlight>
+                <a:latin typeface="Consolas" panose="020B0609020204030204" pitchFamily="49" charset="0"/>
+              </a:rPr>
+              <a:t>Catch a </a:t>
+            </a:r>
+            <a:r>
+              <a:rPr lang="en-US" sz="1600" dirty="0" err="1">
+                <a:solidFill>
+                  <a:srgbClr val="3F5FBF"/>
+                </a:solidFill>
+                <a:highlight>
+                  <a:srgbClr val="FFFF00"/>
+                </a:highlight>
+                <a:latin typeface="Consolas" panose="020B0609020204030204" pitchFamily="49" charset="0"/>
+              </a:rPr>
+              <a:t>FileNotFoundException</a:t>
+            </a:r>
+            <a:r>
+              <a:rPr lang="en-US" sz="1600" dirty="0">
+                <a:solidFill>
+                  <a:srgbClr val="3F5FBF"/>
+                </a:solidFill>
+                <a:highlight>
+                  <a:srgbClr val="FFFF00"/>
+                </a:highlight>
+                <a:latin typeface="Consolas" panose="020B0609020204030204" pitchFamily="49" charset="0"/>
+              </a:rPr>
+              <a:t> in main</a:t>
+            </a:r>
+            <a:r>
+              <a:rPr lang="en-US" sz="1600" dirty="0">
+                <a:solidFill>
+                  <a:srgbClr val="3F5FBF"/>
+                </a:solidFill>
+                <a:latin typeface="Consolas" panose="020B0609020204030204" pitchFamily="49" charset="0"/>
+              </a:rPr>
+              <a:t> to</a:t>
+            </a:r>
+          </a:p>
+          <a:p>
+            <a:pPr algn="l"/>
+            <a:r>
+              <a:rPr lang="en-US" sz="1600" dirty="0">
+                <a:solidFill>
+                  <a:srgbClr val="3F5FBF"/>
+                </a:solidFill>
+                <a:latin typeface="Consolas" panose="020B0609020204030204" pitchFamily="49" charset="0"/>
+              </a:rPr>
+              <a:t> * do this.</a:t>
             </a:r>
             <a:endParaRPr lang="en-US" sz="3600" b="0" strike="noStrike" spc="-1" dirty="0">
               <a:solidFill>
@@ -8236,6 +8337,213 @@
       </p:grpSpPr>
       <p:sp>
         <p:nvSpPr>
+          <p:cNvPr id="3" name="Subtitle 2">
+            <a:extLst>
+              <a:ext uri="{FF2B5EF4-FFF2-40B4-BE49-F238E27FC236}">
+                <a16:creationId xmlns:a16="http://schemas.microsoft.com/office/drawing/2014/main" id="{7E0CB471-39DE-0A4C-FC73-5BA4C13032DA}"/>
+              </a:ext>
+            </a:extLst>
+          </p:cNvPr>
+          <p:cNvSpPr>
+            <a:spLocks noGrp="1"/>
+          </p:cNvSpPr>
+          <p:nvPr>
+            <p:ph type="subTitle"/>
+          </p:nvPr>
+        </p:nvSpPr>
+        <p:spPr>
+          <a:xfrm>
+            <a:off x="86061" y="1604519"/>
+            <a:ext cx="8971878" cy="4807039"/>
+          </a:xfrm>
+        </p:spPr>
+        <p:txBody>
+          <a:bodyPr/>
+          <a:lstStyle/>
+          <a:p>
+            <a:pPr marL="514350" indent="-514350">
+              <a:buFont typeface="+mj-lt"/>
+              <a:buAutoNum type="arabicPeriod"/>
+            </a:pPr>
+            <a:r>
+              <a:rPr lang="en-US" dirty="0"/>
+              <a:t>We delayed processing the exception so we could report the player’s name (more than just that </a:t>
+            </a:r>
+            <a:r>
+              <a:rPr lang="en-US" i="1" dirty="0"/>
+              <a:t>someone</a:t>
+            </a:r>
+            <a:r>
+              <a:rPr lang="en-US" dirty="0"/>
+              <a:t> cheated)</a:t>
+            </a:r>
+          </a:p>
+          <a:p>
+            <a:pPr marL="514350" indent="-514350">
+              <a:buFont typeface="+mj-lt"/>
+              <a:buAutoNum type="arabicPeriod"/>
+            </a:pPr>
+            <a:r>
+              <a:rPr lang="en-US" dirty="0"/>
+              <a:t>What if we wanted to report the player’s name AND </a:t>
+            </a:r>
+            <a:r>
+              <a:rPr lang="en-US" b="1" i="1" dirty="0"/>
+              <a:t>how badly </a:t>
+            </a:r>
+            <a:r>
+              <a:rPr lang="en-US" dirty="0"/>
+              <a:t>they cheated?</a:t>
+            </a:r>
+          </a:p>
+          <a:p>
+            <a:pPr marL="514350" indent="-514350">
+              <a:buFont typeface="+mj-lt"/>
+              <a:buAutoNum type="arabicPeriod"/>
+            </a:pPr>
+            <a:r>
+              <a:rPr lang="en-US" dirty="0"/>
+              <a:t>This requires us to pass such information as data stored </a:t>
+            </a:r>
+            <a:r>
+              <a:rPr lang="en-US" i="1" dirty="0"/>
+              <a:t>inside</a:t>
+            </a:r>
+            <a:r>
+              <a:rPr lang="en-US" dirty="0"/>
+              <a:t> the exception object. To do this, let’s make a new class: </a:t>
+            </a:r>
+            <a:r>
+              <a:rPr lang="en-US" dirty="0" err="1">
+                <a:latin typeface="Consolas" panose="020B0609020204030204" pitchFamily="49" charset="0"/>
+              </a:rPr>
+              <a:t>TooManyScoresException</a:t>
+            </a:r>
+            <a:endParaRPr lang="en-US" dirty="0">
+              <a:latin typeface="Consolas" panose="020B0609020204030204" pitchFamily="49" charset="0"/>
+            </a:endParaRPr>
+          </a:p>
+          <a:p>
+            <a:pPr marL="514350" indent="-514350">
+              <a:buFont typeface="+mj-lt"/>
+              <a:buAutoNum type="arabicPeriod"/>
+            </a:pPr>
+            <a:r>
+              <a:rPr lang="en-US" dirty="0">
+                <a:latin typeface="+mj-lt"/>
+              </a:rPr>
+              <a:t>When we create one we can define the number of actual and allowed scores and then create a method to report that information as needed</a:t>
+            </a:r>
+          </a:p>
+        </p:txBody>
+      </p:sp>
+      <p:sp>
+        <p:nvSpPr>
+          <p:cNvPr id="5" name="CustomShape 1">
+            <a:extLst>
+              <a:ext uri="{FF2B5EF4-FFF2-40B4-BE49-F238E27FC236}">
+                <a16:creationId xmlns:a16="http://schemas.microsoft.com/office/drawing/2014/main" id="{3900E0CC-B32F-4F10-213B-B7B9D20B8BF1}"/>
+              </a:ext>
+            </a:extLst>
+          </p:cNvPr>
+          <p:cNvSpPr/>
+          <p:nvPr/>
+        </p:nvSpPr>
+        <p:spPr>
+          <a:xfrm>
+            <a:off x="457200" y="274680"/>
+            <a:ext cx="8228520" cy="1141920"/>
+          </a:xfrm>
+          <a:prstGeom prst="rect">
+            <a:avLst/>
+          </a:prstGeom>
+          <a:noFill/>
+          <a:ln>
+            <a:noFill/>
+          </a:ln>
+        </p:spPr>
+        <p:style>
+          <a:lnRef idx="0">
+            <a:scrgbClr r="0" g="0" b="0"/>
+          </a:lnRef>
+          <a:fillRef idx="0">
+            <a:scrgbClr r="0" g="0" b="0"/>
+          </a:fillRef>
+          <a:effectRef idx="0">
+            <a:scrgbClr r="0" g="0" b="0"/>
+          </a:effectRef>
+          <a:fontRef idx="minor"/>
+        </p:style>
+        <p:txBody>
+          <a:bodyPr lIns="90000" tIns="45000" rIns="90000" bIns="45000" anchor="ctr"/>
+          <a:lstStyle/>
+          <a:p>
+            <a:pPr algn="ctr">
+              <a:lnSpc>
+                <a:spcPct val="100000"/>
+              </a:lnSpc>
+            </a:pPr>
+            <a:r>
+              <a:rPr lang="en-US" sz="4400" b="0" strike="noStrike" spc="-1" dirty="0">
+                <a:solidFill>
+                  <a:srgbClr val="000000"/>
+                </a:solidFill>
+                <a:uFill>
+                  <a:solidFill>
+                    <a:srgbClr val="FFFFFF"/>
+                  </a:solidFill>
+                </a:uFill>
+                <a:latin typeface="Calibri"/>
+                <a:ea typeface="DejaVu Sans"/>
+              </a:rPr>
+              <a:t>Exception Activity – Part 2</a:t>
+            </a:r>
+            <a:endParaRPr lang="en-US" sz="1800" b="0" strike="noStrike" spc="-1" dirty="0">
+              <a:solidFill>
+                <a:srgbClr val="000000"/>
+              </a:solidFill>
+              <a:uFill>
+                <a:solidFill>
+                  <a:srgbClr val="FFFFFF"/>
+                </a:solidFill>
+              </a:uFill>
+              <a:latin typeface="Arial"/>
+            </a:endParaRPr>
+          </a:p>
+        </p:txBody>
+      </p:sp>
+    </p:spTree>
+    <p:extLst>
+      <p:ext uri="{BB962C8B-B14F-4D97-AF65-F5344CB8AC3E}">
+        <p14:creationId xmlns:p14="http://schemas.microsoft.com/office/powerpoint/2010/main" val="243788862"/>
+      </p:ext>
+    </p:extLst>
+  </p:cSld>
+  <p:clrMapOvr>
+    <a:masterClrMapping/>
+  </p:clrMapOvr>
+</p:sld>
+</file>
+
+<file path=ppt/slides/slide14.xml><?xml version="1.0" encoding="utf-8"?>
+<p:sld xmlns:a="http://schemas.openxmlformats.org/drawingml/2006/main" xmlns:r="http://schemas.openxmlformats.org/officeDocument/2006/relationships" xmlns:p="http://schemas.openxmlformats.org/presentationml/2006/main">
+  <p:cSld>
+    <p:spTree>
+      <p:nvGrpSpPr>
+        <p:cNvPr id="1" name=""/>
+        <p:cNvGrpSpPr/>
+        <p:nvPr/>
+      </p:nvGrpSpPr>
+      <p:grpSpPr>
+        <a:xfrm>
+          <a:off x="0" y="0"/>
+          <a:ext cx="0" cy="0"/>
+          <a:chOff x="0" y="0"/>
+          <a:chExt cx="0" cy="0"/>
+        </a:xfrm>
+      </p:grpSpPr>
+      <p:sp>
+        <p:nvSpPr>
           <p:cNvPr id="2" name="Title 1">
             <a:extLst>
               <a:ext uri="{FF2B5EF4-FFF2-40B4-BE49-F238E27FC236}">
@@ -8293,19 +8601,19 @@
           <a:lstStyle/>
           <a:p>
             <a:r>
-              <a:rPr lang="en-US" dirty="0"/>
+              <a:rPr lang="en-US" sz="3200" dirty="0"/>
               <a:t>You may want to brainstorm with your team.</a:t>
             </a:r>
           </a:p>
           <a:p>
             <a:r>
-              <a:rPr lang="en-US" dirty="0"/>
-              <a:t>What kind of exceptions that should occur?</a:t>
-            </a:r>
-          </a:p>
-          <a:p>
-            <a:r>
-              <a:rPr lang="en-US" dirty="0"/>
+              <a:rPr lang="en-US" sz="3200" dirty="0"/>
+              <a:t>What kind of exceptions should occur?</a:t>
+            </a:r>
+          </a:p>
+          <a:p>
+            <a:r>
+              <a:rPr lang="en-US" sz="3200" dirty="0"/>
               <a:t>What should happen when they occur?</a:t>
             </a:r>
           </a:p>
@@ -16404,6 +16712,15 @@
 </file>
 
 <file path=customXml/item1.xml><?xml version="1.0" encoding="utf-8"?>
+<?mso-contentType ?>
+<FormTemplates xmlns="http://schemas.microsoft.com/sharepoint/v3/contenttype/forms">
+  <Display>DocumentLibraryForm</Display>
+  <Edit>DocumentLibraryForm</Edit>
+  <New>DocumentLibraryForm</New>
+</FormTemplates>
+</file>
+
+<file path=customXml/item2.xml><?xml version="1.0" encoding="utf-8"?>
 <p:properties xmlns:p="http://schemas.microsoft.com/office/2006/metadata/properties" xmlns:xsi="http://www.w3.org/2001/XMLSchema-instance" xmlns:pc="http://schemas.microsoft.com/office/infopath/2007/PartnerControls">
   <documentManagement>
     <TaxCatchAll xmlns="820f9cb1-409d-4c4b-8197-1d4f7dd48124" xsi:nil="true"/>
@@ -16414,7 +16731,7 @@
 </p:properties>
 </file>
 
-<file path=customXml/item2.xml><?xml version="1.0" encoding="utf-8"?>
+<file path=customXml/item3.xml><?xml version="1.0" encoding="utf-8"?>
 <ct:contentTypeSchema xmlns:ct="http://schemas.microsoft.com/office/2006/metadata/contentType" xmlns:ma="http://schemas.microsoft.com/office/2006/metadata/properties/metaAttributes" ct:_="" ma:_="" ma:contentTypeName="Document" ma:contentTypeID="0x0101004285D81DBE5F5A448E892B34D6B8CF20" ma:contentTypeVersion="8" ma:contentTypeDescription="Create a new document." ma:contentTypeScope="" ma:versionID="ecce54155d2ea7caa9aed06c8b6b9867">
   <xsd:schema xmlns:xsd="http://www.w3.org/2001/XMLSchema" xmlns:xs="http://www.w3.org/2001/XMLSchema" xmlns:p="http://schemas.microsoft.com/office/2006/metadata/properties" xmlns:ns2="08600313-7276-4ca7-b5d3-7d86193ee0ac" xmlns:ns3="820f9cb1-409d-4c4b-8197-1d4f7dd48124" targetNamespace="http://schemas.microsoft.com/office/2006/metadata/properties" ma:root="true" ma:fieldsID="bfd7385540b70b2fe84ac888cc214377" ns2:_="" ns3:_="">
     <xsd:import namespace="08600313-7276-4ca7-b5d3-7d86193ee0ac"/>
@@ -16591,16 +16908,15 @@
 </ct:contentTypeSchema>
 </file>
 
-<file path=customXml/item3.xml><?xml version="1.0" encoding="utf-8"?>
-<?mso-contentType ?>
-<FormTemplates xmlns="http://schemas.microsoft.com/sharepoint/v3/contenttype/forms">
-  <Display>DocumentLibraryForm</Display>
-  <Edit>DocumentLibraryForm</Edit>
-  <New>DocumentLibraryForm</New>
-</FormTemplates>
+<file path=customXml/itemProps1.xml><?xml version="1.0" encoding="utf-8"?>
+<ds:datastoreItem xmlns:ds="http://schemas.openxmlformats.org/officeDocument/2006/customXml" ds:itemID="{3B957A52-5263-4C13-94EC-BADD6AC559B8}">
+  <ds:schemaRefs>
+    <ds:schemaRef ds:uri="http://schemas.microsoft.com/sharepoint/v3/contenttype/forms"/>
+  </ds:schemaRefs>
+</ds:datastoreItem>
 </file>
 
-<file path=customXml/itemProps1.xml><?xml version="1.0" encoding="utf-8"?>
+<file path=customXml/itemProps2.xml><?xml version="1.0" encoding="utf-8"?>
 <ds:datastoreItem xmlns:ds="http://schemas.openxmlformats.org/officeDocument/2006/customXml" ds:itemID="{FBC30A03-96C5-4843-A046-F16D54BDCFE9}">
   <ds:schemaRefs>
     <ds:schemaRef ds:uri="http://schemas.microsoft.com/office/2006/metadata/properties"/>
@@ -16611,7 +16927,7 @@
 </ds:datastoreItem>
 </file>
 
-<file path=customXml/itemProps2.xml><?xml version="1.0" encoding="utf-8"?>
+<file path=customXml/itemProps3.xml><?xml version="1.0" encoding="utf-8"?>
 <ds:datastoreItem xmlns:ds="http://schemas.openxmlformats.org/officeDocument/2006/customXml" ds:itemID="{74EDD9DE-4993-48BD-A320-B7ED6C251005}">
   <ds:schemaRefs>
     <ds:schemaRef ds:uri="http://schemas.microsoft.com/office/2006/metadata/contentType"/>
@@ -16628,12 +16944,4 @@
     <ds:schemaRef ds:uri="http://schemas.microsoft.com/internal/obd"/>
   </ds:schemaRefs>
 </ds:datastoreItem>
-</file>
-
-<file path=customXml/itemProps3.xml><?xml version="1.0" encoding="utf-8"?>
-<ds:datastoreItem xmlns:ds="http://schemas.openxmlformats.org/officeDocument/2006/customXml" ds:itemID="{3B957A52-5263-4C13-94EC-BADD6AC559B8}">
-  <ds:schemaRefs>
-    <ds:schemaRef ds:uri="http://schemas.microsoft.com/sharepoint/v3/contenttype/forms"/>
-  </ds:schemaRefs>
-</ds:datastoreItem>
 </file>
</xml_diff>

<commit_message>
updating quiz code for slides
</commit_message>
<xml_diff>
--- a/ClassMaterials/OOAndExceptions/Slides/Part3-ExceptionHandling.pptx
+++ b/ClassMaterials/OOAndExceptions/Slides/Part3-ExceptionHandling.pptx
@@ -7607,12 +7607,56 @@
           <a:chExt cx="0" cy="0"/>
         </a:xfrm>
       </p:grpSpPr>
+      <p:sp>
+        <p:nvSpPr>
+          <p:cNvPr id="3" name="TextBox 2">
+            <a:extLst>
+              <a:ext uri="{FF2B5EF4-FFF2-40B4-BE49-F238E27FC236}">
+                <a16:creationId xmlns:a16="http://schemas.microsoft.com/office/drawing/2014/main" id="{A7AA0C79-D04C-6200-B472-71FB1FBA4AF8}"/>
+              </a:ext>
+            </a:extLst>
+          </p:cNvPr>
+          <p:cNvSpPr txBox="1"/>
+          <p:nvPr/>
+        </p:nvSpPr>
+        <p:spPr>
+          <a:xfrm>
+            <a:off x="289593" y="216805"/>
+            <a:ext cx="2307691" cy="1815882"/>
+          </a:xfrm>
+          <a:prstGeom prst="rect">
+            <a:avLst/>
+          </a:prstGeom>
+          <a:noFill/>
+        </p:spPr>
+        <p:txBody>
+          <a:bodyPr wrap="square" rtlCol="0">
+            <a:spAutoFit/>
+          </a:bodyPr>
+          <a:lstStyle/>
+          <a:p>
+            <a:r>
+              <a:rPr lang="en-US" sz="2800" dirty="0"/>
+              <a:t>Quiz Today:</a:t>
+            </a:r>
+          </a:p>
+          <a:p>
+            <a:endParaRPr lang="en-US" sz="2800" dirty="0"/>
+          </a:p>
+          <a:p>
+            <a:r>
+              <a:rPr lang="en-US" sz="2800" dirty="0"/>
+              <a:t>What does this output?</a:t>
+            </a:r>
+          </a:p>
+        </p:txBody>
+      </p:sp>
       <p:pic>
         <p:nvPicPr>
-          <p:cNvPr id="2" name="Picture 1">
+          <p:cNvPr id="5" name="Picture 4">
             <a:extLst>
               <a:ext uri="{FF2B5EF4-FFF2-40B4-BE49-F238E27FC236}">
-                <a16:creationId xmlns:a16="http://schemas.microsoft.com/office/drawing/2014/main" id="{3F2F8C35-ADDE-DE8C-6BD6-B61A491FA6F3}"/>
+                <a16:creationId xmlns:a16="http://schemas.microsoft.com/office/drawing/2014/main" id="{03DF838F-B8B3-93FA-3C55-B55B3AB16F24}"/>
               </a:ext>
             </a:extLst>
           </p:cNvPr>
@@ -7629,49 +7673,14 @@
         </p:blipFill>
         <p:spPr>
           <a:xfrm>
-            <a:off x="4705149" y="0"/>
-            <a:ext cx="4358254" cy="6858000"/>
+            <a:off x="3038707" y="0"/>
+            <a:ext cx="6105293" cy="6858000"/>
           </a:xfrm>
           <a:prstGeom prst="rect">
             <a:avLst/>
           </a:prstGeom>
         </p:spPr>
       </p:pic>
-      <p:sp>
-        <p:nvSpPr>
-          <p:cNvPr id="3" name="TextBox 2">
-            <a:extLst>
-              <a:ext uri="{FF2B5EF4-FFF2-40B4-BE49-F238E27FC236}">
-                <a16:creationId xmlns:a16="http://schemas.microsoft.com/office/drawing/2014/main" id="{A7AA0C79-D04C-6200-B472-71FB1FBA4AF8}"/>
-              </a:ext>
-            </a:extLst>
-          </p:cNvPr>
-          <p:cNvSpPr txBox="1"/>
-          <p:nvPr/>
-        </p:nvSpPr>
-        <p:spPr>
-          <a:xfrm>
-            <a:off x="231228" y="168166"/>
-            <a:ext cx="3861955" cy="523220"/>
-          </a:xfrm>
-          <a:prstGeom prst="rect">
-            <a:avLst/>
-          </a:prstGeom>
-          <a:noFill/>
-        </p:spPr>
-        <p:txBody>
-          <a:bodyPr wrap="none" rtlCol="0">
-            <a:spAutoFit/>
-          </a:bodyPr>
-          <a:lstStyle/>
-          <a:p>
-            <a:r>
-              <a:rPr lang="en-US" sz="2800" dirty="0"/>
-              <a:t>What does this output?</a:t>
-            </a:r>
-          </a:p>
-        </p:txBody>
-      </p:sp>
     </p:spTree>
     <p:extLst>
       <p:ext uri="{BB962C8B-B14F-4D97-AF65-F5344CB8AC3E}">
@@ -8366,15 +8375,15 @@
               <a:buAutoNum type="arabicPeriod"/>
             </a:pPr>
             <a:r>
-              <a:rPr lang="en-US" dirty="0"/>
+              <a:rPr lang="en-US" sz="2800" dirty="0"/>
               <a:t>We delayed processing the exception so we could report the player’s name (more than just that </a:t>
             </a:r>
             <a:r>
-              <a:rPr lang="en-US" i="1" dirty="0"/>
+              <a:rPr lang="en-US" sz="2800" i="1" dirty="0"/>
               <a:t>someone</a:t>
             </a:r>
             <a:r>
-              <a:rPr lang="en-US" dirty="0"/>
+              <a:rPr lang="en-US" sz="2800" dirty="0"/>
               <a:t> cheated)</a:t>
             </a:r>
           </a:p>
@@ -8384,15 +8393,15 @@
               <a:buAutoNum type="arabicPeriod"/>
             </a:pPr>
             <a:r>
-              <a:rPr lang="en-US" dirty="0"/>
+              <a:rPr lang="en-US" sz="2800" dirty="0"/>
               <a:t>What if we wanted to report the player’s name AND </a:t>
             </a:r>
             <a:r>
-              <a:rPr lang="en-US" b="1" i="1" dirty="0"/>
+              <a:rPr lang="en-US" sz="2800" b="1" i="1" dirty="0"/>
               <a:t>how badly </a:t>
             </a:r>
             <a:r>
-              <a:rPr lang="en-US" dirty="0"/>
+              <a:rPr lang="en-US" sz="2800" dirty="0"/>
               <a:t>they cheated?</a:t>
             </a:r>
           </a:p>
@@ -8402,24 +8411,24 @@
               <a:buAutoNum type="arabicPeriod"/>
             </a:pPr>
             <a:r>
-              <a:rPr lang="en-US" dirty="0"/>
+              <a:rPr lang="en-US" sz="2800" dirty="0"/>
               <a:t>This requires us to pass such information as data stored </a:t>
             </a:r>
             <a:r>
-              <a:rPr lang="en-US" i="1" dirty="0"/>
+              <a:rPr lang="en-US" sz="2800" i="1" dirty="0"/>
               <a:t>inside</a:t>
             </a:r>
             <a:r>
-              <a:rPr lang="en-US" dirty="0"/>
+              <a:rPr lang="en-US" sz="2800" dirty="0"/>
               <a:t> the exception object. To do this, let’s make a new class: </a:t>
             </a:r>
             <a:r>
-              <a:rPr lang="en-US" dirty="0" err="1">
+              <a:rPr lang="en-US" sz="2800" dirty="0" err="1">
                 <a:latin typeface="Consolas" panose="020B0609020204030204" pitchFamily="49" charset="0"/>
               </a:rPr>
               <a:t>TooManyScoresException</a:t>
             </a:r>
-            <a:endParaRPr lang="en-US" dirty="0">
+            <a:endParaRPr lang="en-US" sz="2800" dirty="0">
               <a:latin typeface="Consolas" panose="020B0609020204030204" pitchFamily="49" charset="0"/>
             </a:endParaRPr>
           </a:p>
@@ -8429,7 +8438,7 @@
               <a:buAutoNum type="arabicPeriod"/>
             </a:pPr>
             <a:r>
-              <a:rPr lang="en-US" dirty="0">
+              <a:rPr lang="en-US" sz="2800" dirty="0">
                 <a:latin typeface="+mj-lt"/>
               </a:rPr>
               <a:t>When we create one we can define the number of actual and allowed scores and then create a method to report that information as needed</a:t>
@@ -16712,26 +16721,6 @@
 </file>
 
 <file path=customXml/item1.xml><?xml version="1.0" encoding="utf-8"?>
-<?mso-contentType ?>
-<FormTemplates xmlns="http://schemas.microsoft.com/sharepoint/v3/contenttype/forms">
-  <Display>DocumentLibraryForm</Display>
-  <Edit>DocumentLibraryForm</Edit>
-  <New>DocumentLibraryForm</New>
-</FormTemplates>
-</file>
-
-<file path=customXml/item2.xml><?xml version="1.0" encoding="utf-8"?>
-<p:properties xmlns:p="http://schemas.microsoft.com/office/2006/metadata/properties" xmlns:xsi="http://www.w3.org/2001/XMLSchema-instance" xmlns:pc="http://schemas.microsoft.com/office/infopath/2007/PartnerControls">
-  <documentManagement>
-    <TaxCatchAll xmlns="820f9cb1-409d-4c4b-8197-1d4f7dd48124" xsi:nil="true"/>
-    <lcf76f155ced4ddcb4097134ff3c332f xmlns="08600313-7276-4ca7-b5d3-7d86193ee0ac">
-      <Terms xmlns="http://schemas.microsoft.com/office/infopath/2007/PartnerControls"/>
-    </lcf76f155ced4ddcb4097134ff3c332f>
-  </documentManagement>
-</p:properties>
-</file>
-
-<file path=customXml/item3.xml><?xml version="1.0" encoding="utf-8"?>
 <ct:contentTypeSchema xmlns:ct="http://schemas.microsoft.com/office/2006/metadata/contentType" xmlns:ma="http://schemas.microsoft.com/office/2006/metadata/properties/metaAttributes" ct:_="" ma:_="" ma:contentTypeName="Document" ma:contentTypeID="0x0101004285D81DBE5F5A448E892B34D6B8CF20" ma:contentTypeVersion="8" ma:contentTypeDescription="Create a new document." ma:contentTypeScope="" ma:versionID="ecce54155d2ea7caa9aed06c8b6b9867">
   <xsd:schema xmlns:xsd="http://www.w3.org/2001/XMLSchema" xmlns:xs="http://www.w3.org/2001/XMLSchema" xmlns:p="http://schemas.microsoft.com/office/2006/metadata/properties" xmlns:ns2="08600313-7276-4ca7-b5d3-7d86193ee0ac" xmlns:ns3="820f9cb1-409d-4c4b-8197-1d4f7dd48124" targetNamespace="http://schemas.microsoft.com/office/2006/metadata/properties" ma:root="true" ma:fieldsID="bfd7385540b70b2fe84ac888cc214377" ns2:_="" ns3:_="">
     <xsd:import namespace="08600313-7276-4ca7-b5d3-7d86193ee0ac"/>
@@ -16908,26 +16897,27 @@
 </ct:contentTypeSchema>
 </file>
 
-<file path=customXml/itemProps1.xml><?xml version="1.0" encoding="utf-8"?>
-<ds:datastoreItem xmlns:ds="http://schemas.openxmlformats.org/officeDocument/2006/customXml" ds:itemID="{3B957A52-5263-4C13-94EC-BADD6AC559B8}">
-  <ds:schemaRefs>
-    <ds:schemaRef ds:uri="http://schemas.microsoft.com/sharepoint/v3/contenttype/forms"/>
-  </ds:schemaRefs>
-</ds:datastoreItem>
+<file path=customXml/item2.xml><?xml version="1.0" encoding="utf-8"?>
+<?mso-contentType ?>
+<FormTemplates xmlns="http://schemas.microsoft.com/sharepoint/v3/contenttype/forms">
+  <Display>DocumentLibraryForm</Display>
+  <Edit>DocumentLibraryForm</Edit>
+  <New>DocumentLibraryForm</New>
+</FormTemplates>
 </file>
 
-<file path=customXml/itemProps2.xml><?xml version="1.0" encoding="utf-8"?>
-<ds:datastoreItem xmlns:ds="http://schemas.openxmlformats.org/officeDocument/2006/customXml" ds:itemID="{FBC30A03-96C5-4843-A046-F16D54BDCFE9}">
-  <ds:schemaRefs>
-    <ds:schemaRef ds:uri="http://schemas.microsoft.com/office/2006/metadata/properties"/>
-    <ds:schemaRef ds:uri="http://schemas.microsoft.com/office/infopath/2007/PartnerControls"/>
-    <ds:schemaRef ds:uri="820f9cb1-409d-4c4b-8197-1d4f7dd48124"/>
-    <ds:schemaRef ds:uri="08600313-7276-4ca7-b5d3-7d86193ee0ac"/>
-  </ds:schemaRefs>
-</ds:datastoreItem>
+<file path=customXml/item3.xml><?xml version="1.0" encoding="utf-8"?>
+<p:properties xmlns:p="http://schemas.microsoft.com/office/2006/metadata/properties" xmlns:xsi="http://www.w3.org/2001/XMLSchema-instance" xmlns:pc="http://schemas.microsoft.com/office/infopath/2007/PartnerControls">
+  <documentManagement>
+    <TaxCatchAll xmlns="820f9cb1-409d-4c4b-8197-1d4f7dd48124" xsi:nil="true"/>
+    <lcf76f155ced4ddcb4097134ff3c332f xmlns="08600313-7276-4ca7-b5d3-7d86193ee0ac">
+      <Terms xmlns="http://schemas.microsoft.com/office/infopath/2007/PartnerControls"/>
+    </lcf76f155ced4ddcb4097134ff3c332f>
+  </documentManagement>
+</p:properties>
 </file>
 
-<file path=customXml/itemProps3.xml><?xml version="1.0" encoding="utf-8"?>
+<file path=customXml/itemProps1.xml><?xml version="1.0" encoding="utf-8"?>
 <ds:datastoreItem xmlns:ds="http://schemas.openxmlformats.org/officeDocument/2006/customXml" ds:itemID="{74EDD9DE-4993-48BD-A320-B7ED6C251005}">
   <ds:schemaRefs>
     <ds:schemaRef ds:uri="http://schemas.microsoft.com/office/2006/metadata/contentType"/>
@@ -16944,4 +16934,23 @@
     <ds:schemaRef ds:uri="http://schemas.microsoft.com/internal/obd"/>
   </ds:schemaRefs>
 </ds:datastoreItem>
+</file>
+
+<file path=customXml/itemProps2.xml><?xml version="1.0" encoding="utf-8"?>
+<ds:datastoreItem xmlns:ds="http://schemas.openxmlformats.org/officeDocument/2006/customXml" ds:itemID="{3B957A52-5263-4C13-94EC-BADD6AC559B8}">
+  <ds:schemaRefs>
+    <ds:schemaRef ds:uri="http://schemas.microsoft.com/sharepoint/v3/contenttype/forms"/>
+  </ds:schemaRefs>
+</ds:datastoreItem>
+</file>
+
+<file path=customXml/itemProps3.xml><?xml version="1.0" encoding="utf-8"?>
+<ds:datastoreItem xmlns:ds="http://schemas.openxmlformats.org/officeDocument/2006/customXml" ds:itemID="{FBC30A03-96C5-4843-A046-F16D54BDCFE9}">
+  <ds:schemaRefs>
+    <ds:schemaRef ds:uri="http://schemas.microsoft.com/office/2006/metadata/properties"/>
+    <ds:schemaRef ds:uri="http://schemas.microsoft.com/office/infopath/2007/PartnerControls"/>
+    <ds:schemaRef ds:uri="820f9cb1-409d-4c4b-8197-1d4f7dd48124"/>
+    <ds:schemaRef ds:uri="08600313-7276-4ca7-b5d3-7d86193ee0ac"/>
+  </ds:schemaRefs>
+</ds:datastoreItem>
 </file>
</xml_diff>